<commit_message>
Implemented Command of executors
</commit_message>
<xml_diff>
--- a/Doc/UI Design.pptx
+++ b/Doc/UI Design.pptx
@@ -5,10 +5,11 @@
     <p:sldMasterId id="2147483648" r:id="rId1"/>
   </p:sldMasterIdLst>
   <p:notesMasterIdLst>
-    <p:notesMasterId r:id="rId3"/>
+    <p:notesMasterId r:id="rId4"/>
   </p:notesMasterIdLst>
   <p:sldIdLst>
     <p:sldId id="256" r:id="rId2"/>
+    <p:sldId id="257" r:id="rId3"/>
   </p:sldIdLst>
   <p:sldSz cx="9144000" cy="6858000" type="screen4x3"/>
   <p:notesSz cx="6858000" cy="9144000"/>
@@ -193,7 +194,7 @@
             <a:fld id="{360BB726-B4AA-437F-9776-1FB3CA074112}" type="datetimeFigureOut">
               <a:rPr lang="en-US" smtClean="0"/>
               <a:pPr/>
-              <a:t>4/26/2019</a:t>
+              <a:t>4/29/2019</a:t>
             </a:fld>
             <a:endParaRPr lang="en-US"/>
           </a:p>
@@ -364,7 +365,7 @@
     </p:spTree>
     <p:extLst>
       <p:ext uri="{BB962C8B-B14F-4D97-AF65-F5344CB8AC3E}">
-        <p14:creationId xmlns="" xmlns:p14="http://schemas.microsoft.com/office/powerpoint/2010/main" val="4034910571"/>
+        <p14:creationId xmlns:p14="http://schemas.microsoft.com/office/powerpoint/2010/main" xmlns="" val="4034910571"/>
       </p:ext>
     </p:extLst>
   </p:cSld>
@@ -646,7 +647,7 @@
             <a:fld id="{1D8BD707-D9CF-40AE-B4C6-C98DA3205C09}" type="datetimeFigureOut">
               <a:rPr lang="en-US" smtClean="0"/>
               <a:pPr/>
-              <a:t>4/26/2019</a:t>
+              <a:t>4/29/2019</a:t>
             </a:fld>
             <a:endParaRPr lang="en-US"/>
           </a:p>
@@ -813,7 +814,7 @@
             <a:fld id="{1D8BD707-D9CF-40AE-B4C6-C98DA3205C09}" type="datetimeFigureOut">
               <a:rPr lang="en-US" smtClean="0"/>
               <a:pPr/>
-              <a:t>4/26/2019</a:t>
+              <a:t>4/29/2019</a:t>
             </a:fld>
             <a:endParaRPr lang="en-US"/>
           </a:p>
@@ -990,7 +991,7 @@
             <a:fld id="{1D8BD707-D9CF-40AE-B4C6-C98DA3205C09}" type="datetimeFigureOut">
               <a:rPr lang="en-US" smtClean="0"/>
               <a:pPr/>
-              <a:t>4/26/2019</a:t>
+              <a:t>4/29/2019</a:t>
             </a:fld>
             <a:endParaRPr lang="en-US"/>
           </a:p>
@@ -1157,7 +1158,7 @@
             <a:fld id="{1D8BD707-D9CF-40AE-B4C6-C98DA3205C09}" type="datetimeFigureOut">
               <a:rPr lang="en-US" smtClean="0"/>
               <a:pPr/>
-              <a:t>4/26/2019</a:t>
+              <a:t>4/29/2019</a:t>
             </a:fld>
             <a:endParaRPr lang="en-US"/>
           </a:p>
@@ -1400,7 +1401,7 @@
             <a:fld id="{1D8BD707-D9CF-40AE-B4C6-C98DA3205C09}" type="datetimeFigureOut">
               <a:rPr lang="en-US" smtClean="0"/>
               <a:pPr/>
-              <a:t>4/26/2019</a:t>
+              <a:t>4/29/2019</a:t>
             </a:fld>
             <a:endParaRPr lang="en-US"/>
           </a:p>
@@ -1685,7 +1686,7 @@
             <a:fld id="{1D8BD707-D9CF-40AE-B4C6-C98DA3205C09}" type="datetimeFigureOut">
               <a:rPr lang="en-US" smtClean="0"/>
               <a:pPr/>
-              <a:t>4/26/2019</a:t>
+              <a:t>4/29/2019</a:t>
             </a:fld>
             <a:endParaRPr lang="en-US"/>
           </a:p>
@@ -2104,7 +2105,7 @@
             <a:fld id="{1D8BD707-D9CF-40AE-B4C6-C98DA3205C09}" type="datetimeFigureOut">
               <a:rPr lang="en-US" smtClean="0"/>
               <a:pPr/>
-              <a:t>4/26/2019</a:t>
+              <a:t>4/29/2019</a:t>
             </a:fld>
             <a:endParaRPr lang="en-US"/>
           </a:p>
@@ -2219,7 +2220,7 @@
             <a:fld id="{1D8BD707-D9CF-40AE-B4C6-C98DA3205C09}" type="datetimeFigureOut">
               <a:rPr lang="en-US" smtClean="0"/>
               <a:pPr/>
-              <a:t>4/26/2019</a:t>
+              <a:t>4/29/2019</a:t>
             </a:fld>
             <a:endParaRPr lang="en-US"/>
           </a:p>
@@ -2311,7 +2312,7 @@
             <a:fld id="{1D8BD707-D9CF-40AE-B4C6-C98DA3205C09}" type="datetimeFigureOut">
               <a:rPr lang="en-US" smtClean="0"/>
               <a:pPr/>
-              <a:t>4/26/2019</a:t>
+              <a:t>4/29/2019</a:t>
             </a:fld>
             <a:endParaRPr lang="en-US"/>
           </a:p>
@@ -2585,7 +2586,7 @@
             <a:fld id="{1D8BD707-D9CF-40AE-B4C6-C98DA3205C09}" type="datetimeFigureOut">
               <a:rPr lang="en-US" smtClean="0"/>
               <a:pPr/>
-              <a:t>4/26/2019</a:t>
+              <a:t>4/29/2019</a:t>
             </a:fld>
             <a:endParaRPr lang="en-US"/>
           </a:p>
@@ -2835,7 +2836,7 @@
             <a:fld id="{1D8BD707-D9CF-40AE-B4C6-C98DA3205C09}" type="datetimeFigureOut">
               <a:rPr lang="en-US" smtClean="0"/>
               <a:pPr/>
-              <a:t>4/26/2019</a:t>
+              <a:t>4/29/2019</a:t>
             </a:fld>
             <a:endParaRPr lang="en-US"/>
           </a:p>
@@ -3045,7 +3046,7 @@
             <a:fld id="{1D8BD707-D9CF-40AE-B4C6-C98DA3205C09}" type="datetimeFigureOut">
               <a:rPr lang="en-US" smtClean="0"/>
               <a:pPr/>
-              <a:t>4/26/2019</a:t>
+              <a:t>4/29/2019</a:t>
             </a:fld>
             <a:endParaRPr lang="en-US"/>
           </a:p>
@@ -3400,6 +3401,1632 @@
 </file>
 
 <file path=ppt/slides/slide1.xml><?xml version="1.0" encoding="utf-8"?>
+<p:sld xmlns:a="http://schemas.openxmlformats.org/drawingml/2006/main" xmlns:r="http://schemas.openxmlformats.org/officeDocument/2006/relationships" xmlns:p="http://schemas.openxmlformats.org/presentationml/2006/main">
+  <p:cSld>
+    <p:spTree>
+      <p:nvGrpSpPr>
+        <p:cNvPr id="1" name=""/>
+        <p:cNvGrpSpPr/>
+        <p:nvPr/>
+      </p:nvGrpSpPr>
+      <p:grpSpPr>
+        <a:xfrm>
+          <a:off x="0" y="0"/>
+          <a:ext cx="0" cy="0"/>
+          <a:chOff x="0" y="0"/>
+          <a:chExt cx="0" cy="0"/>
+        </a:xfrm>
+      </p:grpSpPr>
+      <p:sp>
+        <p:nvSpPr>
+          <p:cNvPr id="4" name="Rectangle 3"/>
+          <p:cNvSpPr/>
+          <p:nvPr/>
+        </p:nvSpPr>
+        <p:spPr>
+          <a:xfrm>
+            <a:off x="381000" y="457200"/>
+            <a:ext cx="1600200" cy="381000"/>
+          </a:xfrm>
+          <a:prstGeom prst="rect">
+            <a:avLst/>
+          </a:prstGeom>
+        </p:spPr>
+        <p:style>
+          <a:lnRef idx="2">
+            <a:schemeClr val="accent1">
+              <a:shade val="50000"/>
+            </a:schemeClr>
+          </a:lnRef>
+          <a:fillRef idx="1">
+            <a:schemeClr val="accent1"/>
+          </a:fillRef>
+          <a:effectRef idx="0">
+            <a:schemeClr val="accent1"/>
+          </a:effectRef>
+          <a:fontRef idx="minor">
+            <a:schemeClr val="lt1"/>
+          </a:fontRef>
+        </p:style>
+        <p:txBody>
+          <a:bodyPr rtlCol="0" anchor="ctr"/>
+          <a:lstStyle/>
+          <a:p>
+            <a:pPr algn="ctr"/>
+            <a:r>
+              <a:rPr lang="en-US" altLang="zh-CN" dirty="0" smtClean="0"/>
+              <a:t>Registration</a:t>
+            </a:r>
+            <a:endParaRPr lang="en-US" dirty="0"/>
+          </a:p>
+        </p:txBody>
+      </p:sp>
+      <p:sp>
+        <p:nvSpPr>
+          <p:cNvPr id="5" name="Rectangle 4"/>
+          <p:cNvSpPr/>
+          <p:nvPr/>
+        </p:nvSpPr>
+        <p:spPr>
+          <a:xfrm>
+            <a:off x="381000" y="3200400"/>
+            <a:ext cx="1600200" cy="381000"/>
+          </a:xfrm>
+          <a:prstGeom prst="rect">
+            <a:avLst/>
+          </a:prstGeom>
+        </p:spPr>
+        <p:style>
+          <a:lnRef idx="2">
+            <a:schemeClr val="accent1">
+              <a:shade val="50000"/>
+            </a:schemeClr>
+          </a:lnRef>
+          <a:fillRef idx="1">
+            <a:schemeClr val="accent1"/>
+          </a:fillRef>
+          <a:effectRef idx="0">
+            <a:schemeClr val="accent1"/>
+          </a:effectRef>
+          <a:fontRef idx="minor">
+            <a:schemeClr val="lt1"/>
+          </a:fontRef>
+        </p:style>
+        <p:txBody>
+          <a:bodyPr rtlCol="0" anchor="ctr"/>
+          <a:lstStyle/>
+          <a:p>
+            <a:pPr algn="ctr"/>
+            <a:r>
+              <a:rPr lang="en-US" dirty="0" smtClean="0"/>
+              <a:t>Browser</a:t>
+            </a:r>
+            <a:endParaRPr lang="en-US" dirty="0"/>
+          </a:p>
+        </p:txBody>
+      </p:sp>
+      <p:sp>
+        <p:nvSpPr>
+          <p:cNvPr id="6" name="Rectangle 5"/>
+          <p:cNvSpPr/>
+          <p:nvPr/>
+        </p:nvSpPr>
+        <p:spPr>
+          <a:xfrm>
+            <a:off x="304800" y="381000"/>
+            <a:ext cx="1752600" cy="2209800"/>
+          </a:xfrm>
+          <a:prstGeom prst="rect">
+            <a:avLst/>
+          </a:prstGeom>
+          <a:noFill/>
+        </p:spPr>
+        <p:style>
+          <a:lnRef idx="2">
+            <a:schemeClr val="accent1">
+              <a:shade val="50000"/>
+            </a:schemeClr>
+          </a:lnRef>
+          <a:fillRef idx="1">
+            <a:schemeClr val="accent1"/>
+          </a:fillRef>
+          <a:effectRef idx="0">
+            <a:schemeClr val="accent1"/>
+          </a:effectRef>
+          <a:fontRef idx="minor">
+            <a:schemeClr val="lt1"/>
+          </a:fontRef>
+        </p:style>
+        <p:txBody>
+          <a:bodyPr rtlCol="0" anchor="ctr"/>
+          <a:lstStyle/>
+          <a:p>
+            <a:pPr algn="ctr"/>
+            <a:endParaRPr lang="en-US"/>
+          </a:p>
+        </p:txBody>
+      </p:sp>
+      <p:sp>
+        <p:nvSpPr>
+          <p:cNvPr id="7" name="Rectangle 6"/>
+          <p:cNvSpPr/>
+          <p:nvPr/>
+        </p:nvSpPr>
+        <p:spPr>
+          <a:xfrm>
+            <a:off x="304800" y="3124200"/>
+            <a:ext cx="1752600" cy="2895600"/>
+          </a:xfrm>
+          <a:prstGeom prst="rect">
+            <a:avLst/>
+          </a:prstGeom>
+          <a:noFill/>
+        </p:spPr>
+        <p:style>
+          <a:lnRef idx="2">
+            <a:schemeClr val="accent1">
+              <a:shade val="50000"/>
+            </a:schemeClr>
+          </a:lnRef>
+          <a:fillRef idx="1">
+            <a:schemeClr val="accent1"/>
+          </a:fillRef>
+          <a:effectRef idx="0">
+            <a:schemeClr val="accent1"/>
+          </a:effectRef>
+          <a:fontRef idx="minor">
+            <a:schemeClr val="lt1"/>
+          </a:fontRef>
+        </p:style>
+        <p:txBody>
+          <a:bodyPr rtlCol="0" anchor="ctr"/>
+          <a:lstStyle/>
+          <a:p>
+            <a:pPr algn="ctr"/>
+            <a:endParaRPr lang="en-US"/>
+          </a:p>
+        </p:txBody>
+      </p:sp>
+      <p:sp>
+        <p:nvSpPr>
+          <p:cNvPr id="8" name="TextBox 7"/>
+          <p:cNvSpPr txBox="1"/>
+          <p:nvPr/>
+        </p:nvSpPr>
+        <p:spPr>
+          <a:xfrm>
+            <a:off x="664469" y="3782199"/>
+            <a:ext cx="741165" cy="276999"/>
+          </a:xfrm>
+          <a:prstGeom prst="rect">
+            <a:avLst/>
+          </a:prstGeom>
+          <a:noFill/>
+        </p:spPr>
+        <p:txBody>
+          <a:bodyPr wrap="none" rtlCol="0">
+            <a:spAutoFit/>
+          </a:bodyPr>
+          <a:lstStyle/>
+          <a:p>
+            <a:r>
+              <a:rPr lang="en-US" sz="1200" i="1" u="sng" dirty="0" smtClean="0">
+                <a:solidFill>
+                  <a:srgbClr val="0070C0"/>
+                </a:solidFill>
+              </a:rPr>
+              <a:t>Batteries</a:t>
+            </a:r>
+            <a:endParaRPr lang="en-US" sz="1200" i="1" u="sng" dirty="0">
+              <a:solidFill>
+                <a:srgbClr val="0070C0"/>
+              </a:solidFill>
+            </a:endParaRPr>
+          </a:p>
+        </p:txBody>
+      </p:sp>
+      <p:sp>
+        <p:nvSpPr>
+          <p:cNvPr id="9" name="TextBox 8"/>
+          <p:cNvSpPr txBox="1"/>
+          <p:nvPr/>
+        </p:nvSpPr>
+        <p:spPr>
+          <a:xfrm>
+            <a:off x="969269" y="3962400"/>
+            <a:ext cx="553806" cy="276999"/>
+          </a:xfrm>
+          <a:prstGeom prst="rect">
+            <a:avLst/>
+          </a:prstGeom>
+          <a:noFill/>
+        </p:spPr>
+        <p:txBody>
+          <a:bodyPr wrap="none" rtlCol="0">
+            <a:spAutoFit/>
+          </a:bodyPr>
+          <a:lstStyle/>
+          <a:p>
+            <a:r>
+              <a:rPr lang="en-US" sz="1200" i="1" u="sng" dirty="0" smtClean="0">
+                <a:solidFill>
+                  <a:srgbClr val="0070C0"/>
+                </a:solidFill>
+              </a:rPr>
+              <a:t>Pack1</a:t>
+            </a:r>
+            <a:endParaRPr lang="en-US" sz="1200" i="1" u="sng" dirty="0">
+              <a:solidFill>
+                <a:srgbClr val="0070C0"/>
+              </a:solidFill>
+            </a:endParaRPr>
+          </a:p>
+        </p:txBody>
+      </p:sp>
+      <p:sp>
+        <p:nvSpPr>
+          <p:cNvPr id="10" name="TextBox 9"/>
+          <p:cNvSpPr txBox="1"/>
+          <p:nvPr/>
+        </p:nvSpPr>
+        <p:spPr>
+          <a:xfrm>
+            <a:off x="969269" y="4163199"/>
+            <a:ext cx="553806" cy="276999"/>
+          </a:xfrm>
+          <a:prstGeom prst="rect">
+            <a:avLst/>
+          </a:prstGeom>
+          <a:noFill/>
+        </p:spPr>
+        <p:txBody>
+          <a:bodyPr wrap="none" rtlCol="0">
+            <a:spAutoFit/>
+          </a:bodyPr>
+          <a:lstStyle/>
+          <a:p>
+            <a:r>
+              <a:rPr lang="en-US" sz="1200" i="1" u="sng" dirty="0" smtClean="0">
+                <a:solidFill>
+                  <a:srgbClr val="0070C0"/>
+                </a:solidFill>
+              </a:rPr>
+              <a:t>Pack2</a:t>
+            </a:r>
+            <a:endParaRPr lang="en-US" sz="1200" i="1" u="sng" dirty="0">
+              <a:solidFill>
+                <a:srgbClr val="0070C0"/>
+              </a:solidFill>
+            </a:endParaRPr>
+          </a:p>
+        </p:txBody>
+      </p:sp>
+      <p:sp>
+        <p:nvSpPr>
+          <p:cNvPr id="11" name="TextBox 10"/>
+          <p:cNvSpPr txBox="1"/>
+          <p:nvPr/>
+        </p:nvSpPr>
+        <p:spPr>
+          <a:xfrm>
+            <a:off x="664469" y="4419600"/>
+            <a:ext cx="808235" cy="276999"/>
+          </a:xfrm>
+          <a:prstGeom prst="rect">
+            <a:avLst/>
+          </a:prstGeom>
+          <a:noFill/>
+        </p:spPr>
+        <p:txBody>
+          <a:bodyPr wrap="none" rtlCol="0">
+            <a:spAutoFit/>
+          </a:bodyPr>
+          <a:lstStyle/>
+          <a:p>
+            <a:r>
+              <a:rPr lang="en-US" sz="1200" i="1" u="sng" dirty="0" smtClean="0">
+                <a:solidFill>
+                  <a:srgbClr val="0070C0"/>
+                </a:solidFill>
+              </a:rPr>
+              <a:t>Chambers</a:t>
+            </a:r>
+            <a:endParaRPr lang="en-US" sz="1200" i="1" u="sng" dirty="0">
+              <a:solidFill>
+                <a:srgbClr val="0070C0"/>
+              </a:solidFill>
+            </a:endParaRPr>
+          </a:p>
+        </p:txBody>
+      </p:sp>
+      <p:sp>
+        <p:nvSpPr>
+          <p:cNvPr id="12" name="TextBox 11"/>
+          <p:cNvSpPr txBox="1"/>
+          <p:nvPr/>
+        </p:nvSpPr>
+        <p:spPr>
+          <a:xfrm>
+            <a:off x="969269" y="4599801"/>
+            <a:ext cx="859531" cy="276999"/>
+          </a:xfrm>
+          <a:prstGeom prst="rect">
+            <a:avLst/>
+          </a:prstGeom>
+          <a:noFill/>
+        </p:spPr>
+        <p:txBody>
+          <a:bodyPr wrap="none" rtlCol="0">
+            <a:spAutoFit/>
+          </a:bodyPr>
+          <a:lstStyle/>
+          <a:p>
+            <a:r>
+              <a:rPr lang="en-US" sz="1200" i="1" u="sng" dirty="0" smtClean="0">
+                <a:solidFill>
+                  <a:srgbClr val="0070C0"/>
+                </a:solidFill>
+              </a:rPr>
+              <a:t>Hong Zhan</a:t>
+            </a:r>
+            <a:endParaRPr lang="en-US" sz="1200" i="1" u="sng" dirty="0">
+              <a:solidFill>
+                <a:srgbClr val="0070C0"/>
+              </a:solidFill>
+            </a:endParaRPr>
+          </a:p>
+        </p:txBody>
+      </p:sp>
+      <p:sp>
+        <p:nvSpPr>
+          <p:cNvPr id="20" name="TextBox 19"/>
+          <p:cNvSpPr txBox="1"/>
+          <p:nvPr/>
+        </p:nvSpPr>
+        <p:spPr>
+          <a:xfrm>
+            <a:off x="457200" y="3581400"/>
+            <a:ext cx="576568" cy="276999"/>
+          </a:xfrm>
+          <a:prstGeom prst="rect">
+            <a:avLst/>
+          </a:prstGeom>
+          <a:noFill/>
+        </p:spPr>
+        <p:txBody>
+          <a:bodyPr wrap="none" rtlCol="0">
+            <a:spAutoFit/>
+          </a:bodyPr>
+          <a:lstStyle/>
+          <a:p>
+            <a:r>
+              <a:rPr lang="en-US" sz="1200" i="1" u="sng" dirty="0" smtClean="0">
+                <a:solidFill>
+                  <a:srgbClr val="0070C0"/>
+                </a:solidFill>
+              </a:rPr>
+              <a:t>Assets</a:t>
+            </a:r>
+            <a:endParaRPr lang="en-US" sz="1200" i="1" u="sng" dirty="0">
+              <a:solidFill>
+                <a:srgbClr val="0070C0"/>
+              </a:solidFill>
+            </a:endParaRPr>
+          </a:p>
+        </p:txBody>
+      </p:sp>
+      <p:sp>
+        <p:nvSpPr>
+          <p:cNvPr id="22" name="TextBox 21"/>
+          <p:cNvSpPr txBox="1"/>
+          <p:nvPr/>
+        </p:nvSpPr>
+        <p:spPr>
+          <a:xfrm>
+            <a:off x="457200" y="4800600"/>
+            <a:ext cx="787395" cy="276999"/>
+          </a:xfrm>
+          <a:prstGeom prst="rect">
+            <a:avLst/>
+          </a:prstGeom>
+          <a:noFill/>
+        </p:spPr>
+        <p:txBody>
+          <a:bodyPr wrap="none" rtlCol="0">
+            <a:spAutoFit/>
+          </a:bodyPr>
+          <a:lstStyle/>
+          <a:p>
+            <a:r>
+              <a:rPr lang="en-US" sz="1200" i="1" u="sng" dirty="0" smtClean="0">
+                <a:solidFill>
+                  <a:srgbClr val="0070C0"/>
+                </a:solidFill>
+              </a:rPr>
+              <a:t>Programs</a:t>
+            </a:r>
+            <a:endParaRPr lang="en-US" sz="1200" i="1" u="sng" dirty="0">
+              <a:solidFill>
+                <a:srgbClr val="0070C0"/>
+              </a:solidFill>
+            </a:endParaRPr>
+          </a:p>
+        </p:txBody>
+      </p:sp>
+      <p:sp>
+        <p:nvSpPr>
+          <p:cNvPr id="23" name="TextBox 22"/>
+          <p:cNvSpPr txBox="1"/>
+          <p:nvPr/>
+        </p:nvSpPr>
+        <p:spPr>
+          <a:xfrm>
+            <a:off x="304800" y="3581400"/>
+            <a:ext cx="231154" cy="276999"/>
+          </a:xfrm>
+          <a:prstGeom prst="rect">
+            <a:avLst/>
+          </a:prstGeom>
+          <a:noFill/>
+        </p:spPr>
+        <p:txBody>
+          <a:bodyPr wrap="none" rtlCol="0">
+            <a:spAutoFit/>
+          </a:bodyPr>
+          <a:lstStyle/>
+          <a:p>
+            <a:r>
+              <a:rPr lang="en-US" sz="1200" dirty="0" smtClean="0"/>
+              <a:t>-</a:t>
+            </a:r>
+            <a:endParaRPr lang="en-US" sz="1200" dirty="0"/>
+          </a:p>
+        </p:txBody>
+      </p:sp>
+      <p:sp>
+        <p:nvSpPr>
+          <p:cNvPr id="24" name="TextBox 23"/>
+          <p:cNvSpPr txBox="1"/>
+          <p:nvPr/>
+        </p:nvSpPr>
+        <p:spPr>
+          <a:xfrm>
+            <a:off x="304800" y="4800600"/>
+            <a:ext cx="261610" cy="276999"/>
+          </a:xfrm>
+          <a:prstGeom prst="rect">
+            <a:avLst/>
+          </a:prstGeom>
+          <a:noFill/>
+        </p:spPr>
+        <p:txBody>
+          <a:bodyPr wrap="none" rtlCol="0">
+            <a:spAutoFit/>
+          </a:bodyPr>
+          <a:lstStyle/>
+          <a:p>
+            <a:r>
+              <a:rPr lang="en-US" sz="1200" dirty="0" smtClean="0"/>
+              <a:t>+</a:t>
+            </a:r>
+            <a:endParaRPr lang="en-US" sz="1200" dirty="0"/>
+          </a:p>
+        </p:txBody>
+      </p:sp>
+      <p:sp>
+        <p:nvSpPr>
+          <p:cNvPr id="25" name="TextBox 24"/>
+          <p:cNvSpPr txBox="1"/>
+          <p:nvPr/>
+        </p:nvSpPr>
+        <p:spPr>
+          <a:xfrm>
+            <a:off x="457200" y="4980801"/>
+            <a:ext cx="738087" cy="276999"/>
+          </a:xfrm>
+          <a:prstGeom prst="rect">
+            <a:avLst/>
+          </a:prstGeom>
+          <a:noFill/>
+        </p:spPr>
+        <p:txBody>
+          <a:bodyPr wrap="none" rtlCol="0">
+            <a:spAutoFit/>
+          </a:bodyPr>
+          <a:lstStyle/>
+          <a:p>
+            <a:r>
+              <a:rPr lang="en-US" sz="1200" i="1" u="sng" dirty="0" smtClean="0">
+                <a:solidFill>
+                  <a:srgbClr val="0070C0"/>
+                </a:solidFill>
+              </a:rPr>
+              <a:t>Requests</a:t>
+            </a:r>
+            <a:endParaRPr lang="en-US" sz="1200" i="1" u="sng" dirty="0">
+              <a:solidFill>
+                <a:srgbClr val="0070C0"/>
+              </a:solidFill>
+            </a:endParaRPr>
+          </a:p>
+        </p:txBody>
+      </p:sp>
+      <p:sp>
+        <p:nvSpPr>
+          <p:cNvPr id="26" name="TextBox 25"/>
+          <p:cNvSpPr txBox="1"/>
+          <p:nvPr/>
+        </p:nvSpPr>
+        <p:spPr>
+          <a:xfrm>
+            <a:off x="304800" y="4980801"/>
+            <a:ext cx="261610" cy="276999"/>
+          </a:xfrm>
+          <a:prstGeom prst="rect">
+            <a:avLst/>
+          </a:prstGeom>
+          <a:noFill/>
+        </p:spPr>
+        <p:txBody>
+          <a:bodyPr wrap="none" rtlCol="0">
+            <a:spAutoFit/>
+          </a:bodyPr>
+          <a:lstStyle/>
+          <a:p>
+            <a:r>
+              <a:rPr lang="en-US" sz="1200" dirty="0" smtClean="0"/>
+              <a:t>+</a:t>
+            </a:r>
+            <a:endParaRPr lang="en-US" sz="1200" dirty="0"/>
+          </a:p>
+        </p:txBody>
+      </p:sp>
+      <p:sp>
+        <p:nvSpPr>
+          <p:cNvPr id="27" name="TextBox 26"/>
+          <p:cNvSpPr txBox="1"/>
+          <p:nvPr/>
+        </p:nvSpPr>
+        <p:spPr>
+          <a:xfrm>
+            <a:off x="304800" y="2743200"/>
+            <a:ext cx="1752600" cy="276999"/>
+          </a:xfrm>
+          <a:prstGeom prst="rect">
+            <a:avLst/>
+          </a:prstGeom>
+          <a:solidFill>
+            <a:srgbClr val="FFC000"/>
+          </a:solidFill>
+          <a:ln>
+            <a:solidFill>
+              <a:schemeClr val="accent1">
+                <a:shade val="95000"/>
+                <a:satMod val="105000"/>
+              </a:schemeClr>
+            </a:solidFill>
+          </a:ln>
+        </p:spPr>
+        <p:txBody>
+          <a:bodyPr wrap="square" rtlCol="0">
+            <a:spAutoFit/>
+          </a:bodyPr>
+          <a:lstStyle/>
+          <a:p>
+            <a:pPr algn="ctr"/>
+            <a:r>
+              <a:rPr lang="en-US" sz="1200" b="1" dirty="0" smtClean="0">
+                <a:solidFill>
+                  <a:srgbClr val="0070C0"/>
+                </a:solidFill>
+              </a:rPr>
+              <a:t>Scheduler</a:t>
+            </a:r>
+            <a:endParaRPr lang="en-US" sz="1200" b="1" dirty="0">
+              <a:solidFill>
+                <a:srgbClr val="0070C0"/>
+              </a:solidFill>
+            </a:endParaRPr>
+          </a:p>
+        </p:txBody>
+      </p:sp>
+      <p:sp>
+        <p:nvSpPr>
+          <p:cNvPr id="28" name="TextBox 27"/>
+          <p:cNvSpPr txBox="1"/>
+          <p:nvPr/>
+        </p:nvSpPr>
+        <p:spPr>
+          <a:xfrm>
+            <a:off x="457200" y="838200"/>
+            <a:ext cx="900311" cy="276999"/>
+          </a:xfrm>
+          <a:prstGeom prst="rect">
+            <a:avLst/>
+          </a:prstGeom>
+          <a:noFill/>
+        </p:spPr>
+        <p:txBody>
+          <a:bodyPr wrap="none" rtlCol="0">
+            <a:spAutoFit/>
+          </a:bodyPr>
+          <a:lstStyle/>
+          <a:p>
+            <a:r>
+              <a:rPr lang="en-US" sz="1200" i="1" u="sng" dirty="0" smtClean="0">
+                <a:solidFill>
+                  <a:srgbClr val="0070C0"/>
+                </a:solidFill>
+              </a:rPr>
+              <a:t>New Model</a:t>
+            </a:r>
+            <a:endParaRPr lang="en-US" sz="1200" i="1" u="sng" dirty="0">
+              <a:solidFill>
+                <a:srgbClr val="0070C0"/>
+              </a:solidFill>
+            </a:endParaRPr>
+          </a:p>
+        </p:txBody>
+      </p:sp>
+      <p:sp>
+        <p:nvSpPr>
+          <p:cNvPr id="29" name="TextBox 28"/>
+          <p:cNvSpPr txBox="1"/>
+          <p:nvPr/>
+        </p:nvSpPr>
+        <p:spPr>
+          <a:xfrm>
+            <a:off x="457200" y="1002156"/>
+            <a:ext cx="960712" cy="276999"/>
+          </a:xfrm>
+          <a:prstGeom prst="rect">
+            <a:avLst/>
+          </a:prstGeom>
+          <a:noFill/>
+        </p:spPr>
+        <p:txBody>
+          <a:bodyPr wrap="none" rtlCol="0">
+            <a:spAutoFit/>
+          </a:bodyPr>
+          <a:lstStyle/>
+          <a:p>
+            <a:r>
+              <a:rPr lang="en-US" sz="1200" i="1" u="sng" dirty="0" smtClean="0">
+                <a:solidFill>
+                  <a:srgbClr val="0070C0"/>
+                </a:solidFill>
+              </a:rPr>
+              <a:t>New Battery</a:t>
+            </a:r>
+            <a:endParaRPr lang="en-US" sz="1200" i="1" u="sng" dirty="0">
+              <a:solidFill>
+                <a:srgbClr val="0070C0"/>
+              </a:solidFill>
+            </a:endParaRPr>
+          </a:p>
+        </p:txBody>
+      </p:sp>
+      <p:sp>
+        <p:nvSpPr>
+          <p:cNvPr id="30" name="TextBox 29"/>
+          <p:cNvSpPr txBox="1"/>
+          <p:nvPr/>
+        </p:nvSpPr>
+        <p:spPr>
+          <a:xfrm>
+            <a:off x="457200" y="1166112"/>
+            <a:ext cx="1067023" cy="276999"/>
+          </a:xfrm>
+          <a:prstGeom prst="rect">
+            <a:avLst/>
+          </a:prstGeom>
+          <a:noFill/>
+        </p:spPr>
+        <p:txBody>
+          <a:bodyPr wrap="none" rtlCol="0">
+            <a:spAutoFit/>
+          </a:bodyPr>
+          <a:lstStyle/>
+          <a:p>
+            <a:r>
+              <a:rPr lang="en-US" sz="1200" i="1" u="sng" dirty="0" smtClean="0">
+                <a:solidFill>
+                  <a:srgbClr val="0070C0"/>
+                </a:solidFill>
+              </a:rPr>
+              <a:t>New Chamber</a:t>
+            </a:r>
+            <a:endParaRPr lang="en-US" sz="1200" i="1" u="sng" dirty="0">
+              <a:solidFill>
+                <a:srgbClr val="0070C0"/>
+              </a:solidFill>
+            </a:endParaRPr>
+          </a:p>
+        </p:txBody>
+      </p:sp>
+      <p:sp>
+        <p:nvSpPr>
+          <p:cNvPr id="31" name="TextBox 30"/>
+          <p:cNvSpPr txBox="1"/>
+          <p:nvPr/>
+        </p:nvSpPr>
+        <p:spPr>
+          <a:xfrm>
+            <a:off x="457200" y="1330068"/>
+            <a:ext cx="872675" cy="276999"/>
+          </a:xfrm>
+          <a:prstGeom prst="rect">
+            <a:avLst/>
+          </a:prstGeom>
+          <a:noFill/>
+        </p:spPr>
+        <p:txBody>
+          <a:bodyPr wrap="none" rtlCol="0">
+            <a:spAutoFit/>
+          </a:bodyPr>
+          <a:lstStyle/>
+          <a:p>
+            <a:r>
+              <a:rPr lang="en-US" sz="1200" i="1" u="sng" dirty="0" smtClean="0">
+                <a:solidFill>
+                  <a:srgbClr val="0070C0"/>
+                </a:solidFill>
+              </a:rPr>
+              <a:t>New Tester</a:t>
+            </a:r>
+            <a:endParaRPr lang="en-US" sz="1200" i="1" u="sng" dirty="0">
+              <a:solidFill>
+                <a:srgbClr val="0070C0"/>
+              </a:solidFill>
+            </a:endParaRPr>
+          </a:p>
+        </p:txBody>
+      </p:sp>
+      <p:sp>
+        <p:nvSpPr>
+          <p:cNvPr id="32" name="TextBox 31"/>
+          <p:cNvSpPr txBox="1"/>
+          <p:nvPr/>
+        </p:nvSpPr>
+        <p:spPr>
+          <a:xfrm>
+            <a:off x="457200" y="1494024"/>
+            <a:ext cx="1046184" cy="276999"/>
+          </a:xfrm>
+          <a:prstGeom prst="rect">
+            <a:avLst/>
+          </a:prstGeom>
+          <a:noFill/>
+        </p:spPr>
+        <p:txBody>
+          <a:bodyPr wrap="none" rtlCol="0">
+            <a:spAutoFit/>
+          </a:bodyPr>
+          <a:lstStyle/>
+          <a:p>
+            <a:r>
+              <a:rPr lang="en-US" sz="1200" i="1" u="sng" dirty="0" smtClean="0">
+                <a:solidFill>
+                  <a:srgbClr val="0070C0"/>
+                </a:solidFill>
+              </a:rPr>
+              <a:t>New Program</a:t>
+            </a:r>
+            <a:endParaRPr lang="en-US" sz="1200" i="1" u="sng" dirty="0">
+              <a:solidFill>
+                <a:srgbClr val="0070C0"/>
+              </a:solidFill>
+            </a:endParaRPr>
+          </a:p>
+        </p:txBody>
+      </p:sp>
+      <p:sp>
+        <p:nvSpPr>
+          <p:cNvPr id="33" name="TextBox 32"/>
+          <p:cNvSpPr txBox="1"/>
+          <p:nvPr/>
+        </p:nvSpPr>
+        <p:spPr>
+          <a:xfrm>
+            <a:off x="457200" y="1657980"/>
+            <a:ext cx="1307474" cy="276999"/>
+          </a:xfrm>
+          <a:prstGeom prst="rect">
+            <a:avLst/>
+          </a:prstGeom>
+          <a:noFill/>
+        </p:spPr>
+        <p:txBody>
+          <a:bodyPr wrap="none" rtlCol="0">
+            <a:spAutoFit/>
+          </a:bodyPr>
+          <a:lstStyle/>
+          <a:p>
+            <a:r>
+              <a:rPr lang="en-US" sz="1200" i="1" u="sng" dirty="0" smtClean="0">
+                <a:solidFill>
+                  <a:srgbClr val="0070C0"/>
+                </a:solidFill>
+              </a:rPr>
+              <a:t>New Sub Program</a:t>
+            </a:r>
+            <a:endParaRPr lang="en-US" sz="1200" i="1" u="sng" dirty="0">
+              <a:solidFill>
+                <a:srgbClr val="0070C0"/>
+              </a:solidFill>
+            </a:endParaRPr>
+          </a:p>
+        </p:txBody>
+      </p:sp>
+      <p:sp>
+        <p:nvSpPr>
+          <p:cNvPr id="34" name="TextBox 33"/>
+          <p:cNvSpPr txBox="1"/>
+          <p:nvPr/>
+        </p:nvSpPr>
+        <p:spPr>
+          <a:xfrm>
+            <a:off x="457200" y="1821936"/>
+            <a:ext cx="908839" cy="276999"/>
+          </a:xfrm>
+          <a:prstGeom prst="rect">
+            <a:avLst/>
+          </a:prstGeom>
+          <a:noFill/>
+        </p:spPr>
+        <p:txBody>
+          <a:bodyPr wrap="none" rtlCol="0">
+            <a:spAutoFit/>
+          </a:bodyPr>
+          <a:lstStyle/>
+          <a:p>
+            <a:r>
+              <a:rPr lang="en-US" sz="1200" i="1" u="sng" dirty="0" smtClean="0">
+                <a:solidFill>
+                  <a:srgbClr val="0070C0"/>
+                </a:solidFill>
+              </a:rPr>
+              <a:t>New Recipe</a:t>
+            </a:r>
+            <a:endParaRPr lang="en-US" sz="1200" i="1" u="sng" dirty="0">
+              <a:solidFill>
+                <a:srgbClr val="0070C0"/>
+              </a:solidFill>
+            </a:endParaRPr>
+          </a:p>
+        </p:txBody>
+      </p:sp>
+      <p:sp>
+        <p:nvSpPr>
+          <p:cNvPr id="35" name="TextBox 34"/>
+          <p:cNvSpPr txBox="1"/>
+          <p:nvPr/>
+        </p:nvSpPr>
+        <p:spPr>
+          <a:xfrm>
+            <a:off x="457200" y="1985892"/>
+            <a:ext cx="1508362" cy="276999"/>
+          </a:xfrm>
+          <a:prstGeom prst="rect">
+            <a:avLst/>
+          </a:prstGeom>
+          <a:noFill/>
+        </p:spPr>
+        <p:txBody>
+          <a:bodyPr wrap="none" rtlCol="0">
+            <a:spAutoFit/>
+          </a:bodyPr>
+          <a:lstStyle/>
+          <a:p>
+            <a:r>
+              <a:rPr lang="en-US" sz="1200" i="1" u="sng" dirty="0" smtClean="0">
+                <a:solidFill>
+                  <a:srgbClr val="0070C0"/>
+                </a:solidFill>
+              </a:rPr>
+              <a:t>New Chamber Recipe</a:t>
+            </a:r>
+            <a:endParaRPr lang="en-US" sz="1200" i="1" u="sng" dirty="0">
+              <a:solidFill>
+                <a:srgbClr val="0070C0"/>
+              </a:solidFill>
+            </a:endParaRPr>
+          </a:p>
+        </p:txBody>
+      </p:sp>
+      <p:sp>
+        <p:nvSpPr>
+          <p:cNvPr id="36" name="TextBox 35"/>
+          <p:cNvSpPr txBox="1"/>
+          <p:nvPr/>
+        </p:nvSpPr>
+        <p:spPr>
+          <a:xfrm>
+            <a:off x="457200" y="2149848"/>
+            <a:ext cx="1314014" cy="276999"/>
+          </a:xfrm>
+          <a:prstGeom prst="rect">
+            <a:avLst/>
+          </a:prstGeom>
+          <a:noFill/>
+        </p:spPr>
+        <p:txBody>
+          <a:bodyPr wrap="none" rtlCol="0">
+            <a:spAutoFit/>
+          </a:bodyPr>
+          <a:lstStyle/>
+          <a:p>
+            <a:r>
+              <a:rPr lang="en-US" sz="1200" i="1" u="sng" dirty="0" smtClean="0">
+                <a:solidFill>
+                  <a:srgbClr val="0070C0"/>
+                </a:solidFill>
+              </a:rPr>
+              <a:t>New Tester Recipe</a:t>
+            </a:r>
+            <a:endParaRPr lang="en-US" sz="1200" i="1" u="sng" dirty="0">
+              <a:solidFill>
+                <a:srgbClr val="0070C0"/>
+              </a:solidFill>
+            </a:endParaRPr>
+          </a:p>
+        </p:txBody>
+      </p:sp>
+      <p:sp>
+        <p:nvSpPr>
+          <p:cNvPr id="37" name="TextBox 36"/>
+          <p:cNvSpPr txBox="1"/>
+          <p:nvPr/>
+        </p:nvSpPr>
+        <p:spPr>
+          <a:xfrm>
+            <a:off x="457200" y="2313801"/>
+            <a:ext cx="996876" cy="276999"/>
+          </a:xfrm>
+          <a:prstGeom prst="rect">
+            <a:avLst/>
+          </a:prstGeom>
+          <a:noFill/>
+        </p:spPr>
+        <p:txBody>
+          <a:bodyPr wrap="none" rtlCol="0">
+            <a:spAutoFit/>
+          </a:bodyPr>
+          <a:lstStyle/>
+          <a:p>
+            <a:r>
+              <a:rPr lang="en-US" sz="1200" i="1" u="sng" dirty="0" smtClean="0">
+                <a:solidFill>
+                  <a:srgbClr val="0070C0"/>
+                </a:solidFill>
+              </a:rPr>
+              <a:t>New Request</a:t>
+            </a:r>
+            <a:endParaRPr lang="en-US" sz="1200" i="1" u="sng" dirty="0">
+              <a:solidFill>
+                <a:srgbClr val="0070C0"/>
+              </a:solidFill>
+            </a:endParaRPr>
+          </a:p>
+        </p:txBody>
+      </p:sp>
+      <p:sp>
+        <p:nvSpPr>
+          <p:cNvPr id="38" name="Rectangle 37"/>
+          <p:cNvSpPr/>
+          <p:nvPr/>
+        </p:nvSpPr>
+        <p:spPr>
+          <a:xfrm>
+            <a:off x="2209800" y="457200"/>
+            <a:ext cx="6629400" cy="381000"/>
+          </a:xfrm>
+          <a:prstGeom prst="rect">
+            <a:avLst/>
+          </a:prstGeom>
+        </p:spPr>
+        <p:style>
+          <a:lnRef idx="2">
+            <a:schemeClr val="accent1">
+              <a:shade val="50000"/>
+            </a:schemeClr>
+          </a:lnRef>
+          <a:fillRef idx="1">
+            <a:schemeClr val="accent1"/>
+          </a:fillRef>
+          <a:effectRef idx="0">
+            <a:schemeClr val="accent1"/>
+          </a:effectRef>
+          <a:fontRef idx="minor">
+            <a:schemeClr val="lt1"/>
+          </a:fontRef>
+        </p:style>
+        <p:txBody>
+          <a:bodyPr rtlCol="0" anchor="ctr"/>
+          <a:lstStyle/>
+          <a:p>
+            <a:pPr algn="ctr"/>
+            <a:r>
+              <a:rPr lang="en-US" dirty="0" smtClean="0"/>
+              <a:t>Workspaces</a:t>
+            </a:r>
+            <a:endParaRPr lang="en-US" dirty="0"/>
+          </a:p>
+        </p:txBody>
+      </p:sp>
+      <p:sp>
+        <p:nvSpPr>
+          <p:cNvPr id="39" name="Rectangle 38"/>
+          <p:cNvSpPr/>
+          <p:nvPr/>
+        </p:nvSpPr>
+        <p:spPr>
+          <a:xfrm>
+            <a:off x="2133600" y="381000"/>
+            <a:ext cx="6781800" cy="5638800"/>
+          </a:xfrm>
+          <a:prstGeom prst="rect">
+            <a:avLst/>
+          </a:prstGeom>
+          <a:noFill/>
+        </p:spPr>
+        <p:style>
+          <a:lnRef idx="2">
+            <a:schemeClr val="accent1">
+              <a:shade val="50000"/>
+            </a:schemeClr>
+          </a:lnRef>
+          <a:fillRef idx="1">
+            <a:schemeClr val="accent1"/>
+          </a:fillRef>
+          <a:effectRef idx="0">
+            <a:schemeClr val="accent1"/>
+          </a:effectRef>
+          <a:fontRef idx="minor">
+            <a:schemeClr val="lt1"/>
+          </a:fontRef>
+        </p:style>
+        <p:txBody>
+          <a:bodyPr rtlCol="0" anchor="ctr"/>
+          <a:lstStyle/>
+          <a:p>
+            <a:pPr algn="ctr"/>
+            <a:endParaRPr lang="en-US"/>
+          </a:p>
+        </p:txBody>
+      </p:sp>
+      <p:sp>
+        <p:nvSpPr>
+          <p:cNvPr id="52" name="TextBox 51"/>
+          <p:cNvSpPr txBox="1"/>
+          <p:nvPr/>
+        </p:nvSpPr>
+        <p:spPr>
+          <a:xfrm>
+            <a:off x="2239688" y="942201"/>
+            <a:ext cx="803425" cy="276999"/>
+          </a:xfrm>
+          <a:prstGeom prst="rect">
+            <a:avLst/>
+          </a:prstGeom>
+          <a:noFill/>
+          <a:ln>
+            <a:noFill/>
+          </a:ln>
+        </p:spPr>
+        <p:txBody>
+          <a:bodyPr wrap="none" rtlCol="0">
+            <a:spAutoFit/>
+          </a:bodyPr>
+          <a:lstStyle/>
+          <a:p>
+            <a:r>
+              <a:rPr lang="en-US" sz="1200" dirty="0" smtClean="0"/>
+              <a:t>Scheduler</a:t>
+            </a:r>
+            <a:endParaRPr lang="en-US" sz="1200" dirty="0"/>
+          </a:p>
+        </p:txBody>
+      </p:sp>
+      <p:sp>
+        <p:nvSpPr>
+          <p:cNvPr id="53" name="TextBox 52"/>
+          <p:cNvSpPr txBox="1"/>
+          <p:nvPr/>
+        </p:nvSpPr>
+        <p:spPr>
+          <a:xfrm>
+            <a:off x="3382688" y="990600"/>
+            <a:ext cx="960071" cy="276999"/>
+          </a:xfrm>
+          <a:prstGeom prst="rect">
+            <a:avLst/>
+          </a:prstGeom>
+          <a:noFill/>
+          <a:ln>
+            <a:noFill/>
+          </a:ln>
+        </p:spPr>
+        <p:txBody>
+          <a:bodyPr wrap="none" rtlCol="0">
+            <a:spAutoFit/>
+          </a:bodyPr>
+          <a:lstStyle/>
+          <a:p>
+            <a:r>
+              <a:rPr lang="en-US" sz="1200" dirty="0" smtClean="0"/>
+              <a:t>New Battery</a:t>
+            </a:r>
+            <a:endParaRPr lang="en-US" sz="1200" dirty="0"/>
+          </a:p>
+        </p:txBody>
+      </p:sp>
+      <p:sp>
+        <p:nvSpPr>
+          <p:cNvPr id="54" name="TextBox 53"/>
+          <p:cNvSpPr txBox="1"/>
+          <p:nvPr/>
+        </p:nvSpPr>
+        <p:spPr>
+          <a:xfrm>
+            <a:off x="4631578" y="990600"/>
+            <a:ext cx="550022" cy="276999"/>
+          </a:xfrm>
+          <a:prstGeom prst="rect">
+            <a:avLst/>
+          </a:prstGeom>
+          <a:noFill/>
+          <a:ln>
+            <a:noFill/>
+          </a:ln>
+        </p:spPr>
+        <p:txBody>
+          <a:bodyPr wrap="none" rtlCol="0">
+            <a:spAutoFit/>
+          </a:bodyPr>
+          <a:lstStyle/>
+          <a:p>
+            <a:r>
+              <a:rPr lang="en-US" sz="1200" dirty="0" smtClean="0"/>
+              <a:t>Pack1</a:t>
+            </a:r>
+            <a:endParaRPr lang="en-US" sz="1200" dirty="0"/>
+          </a:p>
+        </p:txBody>
+      </p:sp>
+      <p:cxnSp>
+        <p:nvCxnSpPr>
+          <p:cNvPr id="56" name="Straight Connector 55"/>
+          <p:cNvCxnSpPr/>
+          <p:nvPr/>
+        </p:nvCxnSpPr>
+        <p:spPr>
+          <a:xfrm>
+            <a:off x="2209800" y="914400"/>
+            <a:ext cx="1143000" cy="0"/>
+          </a:xfrm>
+          <a:prstGeom prst="line">
+            <a:avLst/>
+          </a:prstGeom>
+          <a:ln w="19050"/>
+        </p:spPr>
+        <p:style>
+          <a:lnRef idx="1">
+            <a:schemeClr val="accent1"/>
+          </a:lnRef>
+          <a:fillRef idx="0">
+            <a:schemeClr val="accent1"/>
+          </a:fillRef>
+          <a:effectRef idx="0">
+            <a:schemeClr val="accent1"/>
+          </a:effectRef>
+          <a:fontRef idx="minor">
+            <a:schemeClr val="tx1"/>
+          </a:fontRef>
+        </p:style>
+      </p:cxnSp>
+      <p:cxnSp>
+        <p:nvCxnSpPr>
+          <p:cNvPr id="57" name="Straight Connector 56"/>
+          <p:cNvCxnSpPr/>
+          <p:nvPr/>
+        </p:nvCxnSpPr>
+        <p:spPr>
+          <a:xfrm flipV="1">
+            <a:off x="3361766" y="914400"/>
+            <a:ext cx="0" cy="381000"/>
+          </a:xfrm>
+          <a:prstGeom prst="line">
+            <a:avLst/>
+          </a:prstGeom>
+          <a:ln w="19050"/>
+        </p:spPr>
+        <p:style>
+          <a:lnRef idx="1">
+            <a:schemeClr val="accent1"/>
+          </a:lnRef>
+          <a:fillRef idx="0">
+            <a:schemeClr val="accent1"/>
+          </a:fillRef>
+          <a:effectRef idx="0">
+            <a:schemeClr val="accent1"/>
+          </a:effectRef>
+          <a:fontRef idx="minor">
+            <a:schemeClr val="tx1"/>
+          </a:fontRef>
+        </p:style>
+      </p:cxnSp>
+      <p:cxnSp>
+        <p:nvCxnSpPr>
+          <p:cNvPr id="60" name="Straight Connector 59"/>
+          <p:cNvCxnSpPr/>
+          <p:nvPr/>
+        </p:nvCxnSpPr>
+        <p:spPr>
+          <a:xfrm flipV="1">
+            <a:off x="2209800" y="914400"/>
+            <a:ext cx="0" cy="5029200"/>
+          </a:xfrm>
+          <a:prstGeom prst="line">
+            <a:avLst/>
+          </a:prstGeom>
+          <a:ln w="19050"/>
+        </p:spPr>
+        <p:style>
+          <a:lnRef idx="1">
+            <a:schemeClr val="accent1"/>
+          </a:lnRef>
+          <a:fillRef idx="0">
+            <a:schemeClr val="accent1"/>
+          </a:fillRef>
+          <a:effectRef idx="0">
+            <a:schemeClr val="accent1"/>
+          </a:effectRef>
+          <a:fontRef idx="minor">
+            <a:schemeClr val="tx1"/>
+          </a:fontRef>
+        </p:style>
+      </p:cxnSp>
+      <p:cxnSp>
+        <p:nvCxnSpPr>
+          <p:cNvPr id="62" name="Straight Connector 61"/>
+          <p:cNvCxnSpPr/>
+          <p:nvPr/>
+        </p:nvCxnSpPr>
+        <p:spPr>
+          <a:xfrm>
+            <a:off x="2209800" y="5943600"/>
+            <a:ext cx="6629400" cy="0"/>
+          </a:xfrm>
+          <a:prstGeom prst="line">
+            <a:avLst/>
+          </a:prstGeom>
+          <a:ln w="19050"/>
+        </p:spPr>
+        <p:style>
+          <a:lnRef idx="1">
+            <a:schemeClr val="accent1"/>
+          </a:lnRef>
+          <a:fillRef idx="0">
+            <a:schemeClr val="accent1"/>
+          </a:fillRef>
+          <a:effectRef idx="0">
+            <a:schemeClr val="accent1"/>
+          </a:effectRef>
+          <a:fontRef idx="minor">
+            <a:schemeClr val="tx1"/>
+          </a:fontRef>
+        </p:style>
+      </p:cxnSp>
+      <p:cxnSp>
+        <p:nvCxnSpPr>
+          <p:cNvPr id="65" name="Straight Connector 64"/>
+          <p:cNvCxnSpPr/>
+          <p:nvPr/>
+        </p:nvCxnSpPr>
+        <p:spPr>
+          <a:xfrm flipV="1">
+            <a:off x="8839200" y="1295400"/>
+            <a:ext cx="0" cy="4648200"/>
+          </a:xfrm>
+          <a:prstGeom prst="line">
+            <a:avLst/>
+          </a:prstGeom>
+          <a:ln w="19050"/>
+        </p:spPr>
+        <p:style>
+          <a:lnRef idx="1">
+            <a:schemeClr val="accent1"/>
+          </a:lnRef>
+          <a:fillRef idx="0">
+            <a:schemeClr val="accent1"/>
+          </a:fillRef>
+          <a:effectRef idx="0">
+            <a:schemeClr val="accent1"/>
+          </a:effectRef>
+          <a:fontRef idx="minor">
+            <a:schemeClr val="tx1"/>
+          </a:fontRef>
+        </p:style>
+      </p:cxnSp>
+      <p:cxnSp>
+        <p:nvCxnSpPr>
+          <p:cNvPr id="66" name="Straight Connector 65"/>
+          <p:cNvCxnSpPr/>
+          <p:nvPr/>
+        </p:nvCxnSpPr>
+        <p:spPr>
+          <a:xfrm>
+            <a:off x="3352800" y="1295400"/>
+            <a:ext cx="5486400" cy="0"/>
+          </a:xfrm>
+          <a:prstGeom prst="line">
+            <a:avLst/>
+          </a:prstGeom>
+          <a:ln w="19050"/>
+        </p:spPr>
+        <p:style>
+          <a:lnRef idx="1">
+            <a:schemeClr val="accent1"/>
+          </a:lnRef>
+          <a:fillRef idx="0">
+            <a:schemeClr val="accent1"/>
+          </a:fillRef>
+          <a:effectRef idx="0">
+            <a:schemeClr val="accent1"/>
+          </a:effectRef>
+          <a:fontRef idx="minor">
+            <a:schemeClr val="tx1"/>
+          </a:fontRef>
+        </p:style>
+      </p:cxnSp>
+      <p:cxnSp>
+        <p:nvCxnSpPr>
+          <p:cNvPr id="71" name="Straight Connector 70"/>
+          <p:cNvCxnSpPr/>
+          <p:nvPr/>
+        </p:nvCxnSpPr>
+        <p:spPr>
+          <a:xfrm>
+            <a:off x="3352800" y="990600"/>
+            <a:ext cx="1295400" cy="0"/>
+          </a:xfrm>
+          <a:prstGeom prst="line">
+            <a:avLst/>
+          </a:prstGeom>
+          <a:ln w="19050"/>
+        </p:spPr>
+        <p:style>
+          <a:lnRef idx="1">
+            <a:schemeClr val="accent1"/>
+          </a:lnRef>
+          <a:fillRef idx="0">
+            <a:schemeClr val="accent1"/>
+          </a:fillRef>
+          <a:effectRef idx="0">
+            <a:schemeClr val="accent1"/>
+          </a:effectRef>
+          <a:fontRef idx="minor">
+            <a:schemeClr val="tx1"/>
+          </a:fontRef>
+        </p:style>
+      </p:cxnSp>
+      <p:cxnSp>
+        <p:nvCxnSpPr>
+          <p:cNvPr id="73" name="Straight Connector 72"/>
+          <p:cNvCxnSpPr/>
+          <p:nvPr/>
+        </p:nvCxnSpPr>
+        <p:spPr>
+          <a:xfrm flipV="1">
+            <a:off x="4648200" y="990600"/>
+            <a:ext cx="0" cy="304800"/>
+          </a:xfrm>
+          <a:prstGeom prst="line">
+            <a:avLst/>
+          </a:prstGeom>
+          <a:ln w="19050"/>
+        </p:spPr>
+        <p:style>
+          <a:lnRef idx="1">
+            <a:schemeClr val="accent1"/>
+          </a:lnRef>
+          <a:fillRef idx="0">
+            <a:schemeClr val="accent1"/>
+          </a:fillRef>
+          <a:effectRef idx="0">
+            <a:schemeClr val="accent1"/>
+          </a:effectRef>
+          <a:fontRef idx="minor">
+            <a:schemeClr val="tx1"/>
+          </a:fontRef>
+        </p:style>
+      </p:cxnSp>
+      <p:cxnSp>
+        <p:nvCxnSpPr>
+          <p:cNvPr id="75" name="Straight Connector 74"/>
+          <p:cNvCxnSpPr/>
+          <p:nvPr/>
+        </p:nvCxnSpPr>
+        <p:spPr>
+          <a:xfrm>
+            <a:off x="4648200" y="990600"/>
+            <a:ext cx="838200" cy="0"/>
+          </a:xfrm>
+          <a:prstGeom prst="line">
+            <a:avLst/>
+          </a:prstGeom>
+          <a:ln w="19050"/>
+        </p:spPr>
+        <p:style>
+          <a:lnRef idx="1">
+            <a:schemeClr val="accent1"/>
+          </a:lnRef>
+          <a:fillRef idx="0">
+            <a:schemeClr val="accent1"/>
+          </a:fillRef>
+          <a:effectRef idx="0">
+            <a:schemeClr val="accent1"/>
+          </a:effectRef>
+          <a:fontRef idx="minor">
+            <a:schemeClr val="tx1"/>
+          </a:fontRef>
+        </p:style>
+      </p:cxnSp>
+      <p:cxnSp>
+        <p:nvCxnSpPr>
+          <p:cNvPr id="76" name="Straight Connector 75"/>
+          <p:cNvCxnSpPr/>
+          <p:nvPr/>
+        </p:nvCxnSpPr>
+        <p:spPr>
+          <a:xfrm flipV="1">
+            <a:off x="5486400" y="990600"/>
+            <a:ext cx="0" cy="304800"/>
+          </a:xfrm>
+          <a:prstGeom prst="line">
+            <a:avLst/>
+          </a:prstGeom>
+          <a:ln w="19050"/>
+        </p:spPr>
+        <p:style>
+          <a:lnRef idx="1">
+            <a:schemeClr val="accent1"/>
+          </a:lnRef>
+          <a:fillRef idx="0">
+            <a:schemeClr val="accent1"/>
+          </a:fillRef>
+          <a:effectRef idx="0">
+            <a:schemeClr val="accent1"/>
+          </a:effectRef>
+          <a:fontRef idx="minor">
+            <a:schemeClr val="tx1"/>
+          </a:fontRef>
+        </p:style>
+      </p:cxnSp>
+      <p:sp>
+        <p:nvSpPr>
+          <p:cNvPr id="78" name="TextBox 77"/>
+          <p:cNvSpPr txBox="1"/>
+          <p:nvPr/>
+        </p:nvSpPr>
+        <p:spPr>
+          <a:xfrm>
+            <a:off x="3048000" y="990600"/>
+            <a:ext cx="237566" cy="215444"/>
+          </a:xfrm>
+          <a:prstGeom prst="rect">
+            <a:avLst/>
+          </a:prstGeom>
+          <a:noFill/>
+          <a:ln>
+            <a:solidFill>
+              <a:schemeClr val="accent1">
+                <a:shade val="95000"/>
+                <a:satMod val="105000"/>
+              </a:schemeClr>
+            </a:solidFill>
+          </a:ln>
+        </p:spPr>
+        <p:txBody>
+          <a:bodyPr wrap="none" rtlCol="0">
+            <a:spAutoFit/>
+          </a:bodyPr>
+          <a:lstStyle/>
+          <a:p>
+            <a:r>
+              <a:rPr lang="en-US" sz="800" dirty="0" smtClean="0"/>
+              <a:t>X</a:t>
+            </a:r>
+            <a:endParaRPr lang="en-US" sz="800" dirty="0"/>
+          </a:p>
+        </p:txBody>
+      </p:sp>
+      <p:sp>
+        <p:nvSpPr>
+          <p:cNvPr id="81" name="TextBox 80"/>
+          <p:cNvSpPr txBox="1"/>
+          <p:nvPr/>
+        </p:nvSpPr>
+        <p:spPr>
+          <a:xfrm>
+            <a:off x="4334434" y="1029634"/>
+            <a:ext cx="237566" cy="215444"/>
+          </a:xfrm>
+          <a:prstGeom prst="rect">
+            <a:avLst/>
+          </a:prstGeom>
+          <a:noFill/>
+          <a:ln>
+            <a:solidFill>
+              <a:schemeClr val="accent1">
+                <a:shade val="95000"/>
+                <a:satMod val="105000"/>
+              </a:schemeClr>
+            </a:solidFill>
+          </a:ln>
+        </p:spPr>
+        <p:txBody>
+          <a:bodyPr wrap="none" rtlCol="0">
+            <a:spAutoFit/>
+          </a:bodyPr>
+          <a:lstStyle/>
+          <a:p>
+            <a:r>
+              <a:rPr lang="en-US" sz="800" dirty="0" smtClean="0"/>
+              <a:t>X</a:t>
+            </a:r>
+            <a:endParaRPr lang="en-US" sz="800" dirty="0"/>
+          </a:p>
+        </p:txBody>
+      </p:sp>
+      <p:sp>
+        <p:nvSpPr>
+          <p:cNvPr id="82" name="TextBox 81"/>
+          <p:cNvSpPr txBox="1"/>
+          <p:nvPr/>
+        </p:nvSpPr>
+        <p:spPr>
+          <a:xfrm>
+            <a:off x="5172634" y="1029634"/>
+            <a:ext cx="237566" cy="215444"/>
+          </a:xfrm>
+          <a:prstGeom prst="rect">
+            <a:avLst/>
+          </a:prstGeom>
+          <a:noFill/>
+          <a:ln>
+            <a:solidFill>
+              <a:schemeClr val="accent1">
+                <a:shade val="95000"/>
+                <a:satMod val="105000"/>
+              </a:schemeClr>
+            </a:solidFill>
+          </a:ln>
+        </p:spPr>
+        <p:txBody>
+          <a:bodyPr wrap="none" rtlCol="0">
+            <a:spAutoFit/>
+          </a:bodyPr>
+          <a:lstStyle/>
+          <a:p>
+            <a:r>
+              <a:rPr lang="en-US" sz="800" dirty="0" smtClean="0"/>
+              <a:t>X</a:t>
+            </a:r>
+            <a:endParaRPr lang="en-US" sz="800" dirty="0"/>
+          </a:p>
+        </p:txBody>
+      </p:sp>
+    </p:spTree>
+  </p:cSld>
+  <p:clrMapOvr>
+    <a:masterClrMapping/>
+  </p:clrMapOvr>
+</p:sld>
+</file>
+
+<file path=ppt/slides/slide2.xml><?xml version="1.0" encoding="utf-8"?>
 <p:sld xmlns:a="http://schemas.openxmlformats.org/drawingml/2006/main" xmlns:r="http://schemas.openxmlformats.org/officeDocument/2006/relationships" xmlns:p="http://schemas.openxmlformats.org/presentationml/2006/main">
   <p:cSld>
     <p:spTree>

</xml_diff>

<commit_message>
updated IsNewBatteryType and CanSave
</commit_message>
<xml_diff>
--- a/Doc/UI Design.pptx
+++ b/Doc/UI Design.pptx
@@ -5,11 +5,10 @@
     <p:sldMasterId id="2147483648" r:id="rId1"/>
   </p:sldMasterIdLst>
   <p:notesMasterIdLst>
-    <p:notesMasterId r:id="rId4"/>
+    <p:notesMasterId r:id="rId3"/>
   </p:notesMasterIdLst>
   <p:sldIdLst>
     <p:sldId id="256" r:id="rId2"/>
-    <p:sldId id="257" r:id="rId3"/>
   </p:sldIdLst>
   <p:sldSz cx="9144000" cy="6858000" type="screen4x3"/>
   <p:notesSz cx="6858000" cy="9144000"/>
@@ -111,6 +110,318 @@
 </p:presentation>
 </file>
 
+<file path=ppt/charts/chart1.xml><?xml version="1.0" encoding="utf-8"?>
+<c:chartSpace xmlns:c="http://schemas.openxmlformats.org/drawingml/2006/chart" xmlns:a="http://schemas.openxmlformats.org/drawingml/2006/main" xmlns:r="http://schemas.openxmlformats.org/officeDocument/2006/relationships">
+  <c:lang val="en-US"/>
+  <c:chart>
+    <c:title>
+      <c:tx>
+        <c:rich>
+          <a:bodyPr/>
+          <a:lstStyle/>
+          <a:p>
+            <a:pPr>
+              <a:defRPr/>
+            </a:pPr>
+            <a:r>
+              <a:rPr lang="en-US" sz="1400" dirty="0"/>
+              <a:t>Task Status</a:t>
+            </a:r>
+          </a:p>
+        </c:rich>
+      </c:tx>
+      <c:layout>
+        <c:manualLayout>
+          <c:xMode val="edge"/>
+          <c:yMode val="edge"/>
+          <c:x val="0.26867180664916884"/>
+          <c:y val="7.1428571428571425E-2"/>
+        </c:manualLayout>
+      </c:layout>
+    </c:title>
+    <c:plotArea>
+      <c:layout/>
+      <c:pieChart>
+        <c:varyColors val="1"/>
+        <c:ser>
+          <c:idx val="0"/>
+          <c:order val="0"/>
+          <c:tx>
+            <c:strRef>
+              <c:f>Sheet1!$B$1</c:f>
+              <c:strCache>
+                <c:ptCount val="1"/>
+                <c:pt idx="0">
+                  <c:v>Task Status</c:v>
+                </c:pt>
+              </c:strCache>
+            </c:strRef>
+          </c:tx>
+          <c:cat>
+            <c:strRef>
+              <c:f>Sheet1!$A$2:$A$7</c:f>
+              <c:strCache>
+                <c:ptCount val="6"/>
+                <c:pt idx="0">
+                  <c:v>Waiting</c:v>
+                </c:pt>
+                <c:pt idx="1">
+                  <c:v>Ready</c:v>
+                </c:pt>
+                <c:pt idx="2">
+                  <c:v>Executing</c:v>
+                </c:pt>
+                <c:pt idx="3">
+                  <c:v>Completed</c:v>
+                </c:pt>
+                <c:pt idx="4">
+                  <c:v>Invalid</c:v>
+                </c:pt>
+                <c:pt idx="5">
+                  <c:v>Abandoned</c:v>
+                </c:pt>
+              </c:strCache>
+            </c:strRef>
+          </c:cat>
+          <c:val>
+            <c:numRef>
+              <c:f>Sheet1!$B$2:$B$7</c:f>
+              <c:numCache>
+                <c:formatCode>General</c:formatCode>
+                <c:ptCount val="6"/>
+                <c:pt idx="0">
+                  <c:v>8.1999999999999993</c:v>
+                </c:pt>
+                <c:pt idx="1">
+                  <c:v>3.2</c:v>
+                </c:pt>
+                <c:pt idx="2">
+                  <c:v>1.4</c:v>
+                </c:pt>
+                <c:pt idx="3">
+                  <c:v>1.2</c:v>
+                </c:pt>
+                <c:pt idx="4">
+                  <c:v>3.2</c:v>
+                </c:pt>
+                <c:pt idx="5">
+                  <c:v>5</c:v>
+                </c:pt>
+              </c:numCache>
+            </c:numRef>
+          </c:val>
+        </c:ser>
+        <c:firstSliceAng val="0"/>
+      </c:pieChart>
+    </c:plotArea>
+    <c:legend>
+      <c:legendPos val="r"/>
+      <c:layout>
+        <c:manualLayout>
+          <c:xMode val="edge"/>
+          <c:yMode val="edge"/>
+          <c:x val="0.64415791776027997"/>
+          <c:y val="7.2453130858642675E-2"/>
+          <c:w val="0.26903652668416445"/>
+          <c:h val="0.92754686914135731"/>
+        </c:manualLayout>
+      </c:layout>
+      <c:txPr>
+        <a:bodyPr/>
+        <a:lstStyle/>
+        <a:p>
+          <a:pPr>
+            <a:defRPr sz="1000"/>
+          </a:pPr>
+          <a:endParaRPr lang="en-US"/>
+        </a:p>
+      </c:txPr>
+    </c:legend>
+    <c:plotVisOnly val="1"/>
+  </c:chart>
+  <c:txPr>
+    <a:bodyPr/>
+    <a:lstStyle/>
+    <a:p>
+      <a:pPr>
+        <a:defRPr sz="1800"/>
+      </a:pPr>
+      <a:endParaRPr lang="en-US"/>
+    </a:p>
+  </c:txPr>
+  <c:externalData r:id="rId1"/>
+</c:chartSpace>
+</file>
+
+<file path=ppt/charts/chart2.xml><?xml version="1.0" encoding="utf-8"?>
+<c:chartSpace xmlns:c="http://schemas.openxmlformats.org/drawingml/2006/chart" xmlns:a="http://schemas.openxmlformats.org/drawingml/2006/main" xmlns:r="http://schemas.openxmlformats.org/officeDocument/2006/relationships">
+  <c:lang val="en-US"/>
+  <c:chart>
+    <c:plotArea>
+      <c:layout/>
+      <c:barChart>
+        <c:barDir val="col"/>
+        <c:grouping val="percentStacked"/>
+        <c:ser>
+          <c:idx val="0"/>
+          <c:order val="0"/>
+          <c:tx>
+            <c:strRef>
+              <c:f>Sheet1!$B$1</c:f>
+              <c:strCache>
+                <c:ptCount val="1"/>
+                <c:pt idx="0">
+                  <c:v>Series 1</c:v>
+                </c:pt>
+              </c:strCache>
+            </c:strRef>
+          </c:tx>
+          <c:cat>
+            <c:strRef>
+              <c:f>Sheet1!$A$2:$A$4</c:f>
+              <c:strCache>
+                <c:ptCount val="3"/>
+                <c:pt idx="0">
+                  <c:v>Battery</c:v>
+                </c:pt>
+                <c:pt idx="1">
+                  <c:v>Chamber</c:v>
+                </c:pt>
+                <c:pt idx="2">
+                  <c:v>Tester</c:v>
+                </c:pt>
+              </c:strCache>
+            </c:strRef>
+          </c:cat>
+          <c:val>
+            <c:numRef>
+              <c:f>Sheet1!$B$2:$B$4</c:f>
+              <c:numCache>
+                <c:formatCode>General</c:formatCode>
+                <c:ptCount val="3"/>
+                <c:pt idx="0">
+                  <c:v>4.3</c:v>
+                </c:pt>
+                <c:pt idx="1">
+                  <c:v>2.5</c:v>
+                </c:pt>
+                <c:pt idx="2">
+                  <c:v>3.5</c:v>
+                </c:pt>
+              </c:numCache>
+            </c:numRef>
+          </c:val>
+        </c:ser>
+        <c:ser>
+          <c:idx val="1"/>
+          <c:order val="1"/>
+          <c:tx>
+            <c:strRef>
+              <c:f>Sheet1!$C$1</c:f>
+              <c:strCache>
+                <c:ptCount val="1"/>
+                <c:pt idx="0">
+                  <c:v>Series 2</c:v>
+                </c:pt>
+              </c:strCache>
+            </c:strRef>
+          </c:tx>
+          <c:cat>
+            <c:strRef>
+              <c:f>Sheet1!$A$2:$A$4</c:f>
+              <c:strCache>
+                <c:ptCount val="3"/>
+                <c:pt idx="0">
+                  <c:v>Battery</c:v>
+                </c:pt>
+                <c:pt idx="1">
+                  <c:v>Chamber</c:v>
+                </c:pt>
+                <c:pt idx="2">
+                  <c:v>Tester</c:v>
+                </c:pt>
+              </c:strCache>
+            </c:strRef>
+          </c:cat>
+          <c:val>
+            <c:numRef>
+              <c:f>Sheet1!$C$2:$C$4</c:f>
+              <c:numCache>
+                <c:formatCode>General</c:formatCode>
+                <c:ptCount val="3"/>
+                <c:pt idx="0">
+                  <c:v>2.4</c:v>
+                </c:pt>
+                <c:pt idx="1">
+                  <c:v>4.4000000000000004</c:v>
+                </c:pt>
+                <c:pt idx="2">
+                  <c:v>1.8</c:v>
+                </c:pt>
+              </c:numCache>
+            </c:numRef>
+          </c:val>
+        </c:ser>
+        <c:overlap val="100"/>
+        <c:axId val="83321984"/>
+        <c:axId val="83331712"/>
+      </c:barChart>
+      <c:catAx>
+        <c:axId val="83321984"/>
+        <c:scaling>
+          <c:orientation val="minMax"/>
+        </c:scaling>
+        <c:axPos val="b"/>
+        <c:tickLblPos val="nextTo"/>
+        <c:txPr>
+          <a:bodyPr/>
+          <a:lstStyle/>
+          <a:p>
+            <a:pPr>
+              <a:defRPr sz="1000" baseline="0"/>
+            </a:pPr>
+            <a:endParaRPr lang="en-US"/>
+          </a:p>
+        </c:txPr>
+        <c:crossAx val="83331712"/>
+        <c:crosses val="autoZero"/>
+        <c:auto val="1"/>
+        <c:lblAlgn val="ctr"/>
+        <c:lblOffset val="100"/>
+      </c:catAx>
+      <c:valAx>
+        <c:axId val="83331712"/>
+        <c:scaling>
+          <c:orientation val="minMax"/>
+        </c:scaling>
+        <c:delete val="1"/>
+        <c:axPos val="l"/>
+        <c:numFmt formatCode="0%" sourceLinked="1"/>
+        <c:tickLblPos val="none"/>
+        <c:crossAx val="83321984"/>
+        <c:crosses val="autoZero"/>
+        <c:crossBetween val="between"/>
+      </c:valAx>
+      <c:spPr>
+        <a:noFill/>
+      </c:spPr>
+    </c:plotArea>
+    <c:plotVisOnly val="1"/>
+  </c:chart>
+  <c:txPr>
+    <a:bodyPr/>
+    <a:lstStyle/>
+    <a:p>
+      <a:pPr>
+        <a:defRPr sz="1800"/>
+      </a:pPr>
+      <a:endParaRPr lang="en-US"/>
+    </a:p>
+  </c:txPr>
+  <c:externalData r:id="rId1"/>
+</c:chartSpace>
+</file>
+
 <file path=ppt/notesMasters/notesMaster1.xml><?xml version="1.0" encoding="utf-8"?>
 <p:notesMaster xmlns:a="http://schemas.openxmlformats.org/drawingml/2006/main" xmlns:r="http://schemas.openxmlformats.org/officeDocument/2006/relationships" xmlns:p="http://schemas.openxmlformats.org/presentationml/2006/main">
   <p:cSld>
@@ -194,7 +505,7 @@
             <a:fld id="{360BB726-B4AA-437F-9776-1FB3CA074112}" type="datetimeFigureOut">
               <a:rPr lang="en-US" smtClean="0"/>
               <a:pPr/>
-              <a:t>4/29/2019</a:t>
+              <a:t>5/17/2019</a:t>
             </a:fld>
             <a:endParaRPr lang="en-US"/>
           </a:p>
@@ -365,7 +676,7 @@
     </p:spTree>
     <p:extLst>
       <p:ext uri="{BB962C8B-B14F-4D97-AF65-F5344CB8AC3E}">
-        <p14:creationId xmlns:p14="http://schemas.microsoft.com/office/powerpoint/2010/main" xmlns="" val="4034910571"/>
+        <p14:creationId xmlns="" xmlns:p14="http://schemas.microsoft.com/office/powerpoint/2010/main" val="4034910571"/>
       </p:ext>
     </p:extLst>
   </p:cSld>
@@ -647,7 +958,7 @@
             <a:fld id="{1D8BD707-D9CF-40AE-B4C6-C98DA3205C09}" type="datetimeFigureOut">
               <a:rPr lang="en-US" smtClean="0"/>
               <a:pPr/>
-              <a:t>4/29/2019</a:t>
+              <a:t>5/17/2019</a:t>
             </a:fld>
             <a:endParaRPr lang="en-US"/>
           </a:p>
@@ -814,7 +1125,7 @@
             <a:fld id="{1D8BD707-D9CF-40AE-B4C6-C98DA3205C09}" type="datetimeFigureOut">
               <a:rPr lang="en-US" smtClean="0"/>
               <a:pPr/>
-              <a:t>4/29/2019</a:t>
+              <a:t>5/17/2019</a:t>
             </a:fld>
             <a:endParaRPr lang="en-US"/>
           </a:p>
@@ -991,7 +1302,7 @@
             <a:fld id="{1D8BD707-D9CF-40AE-B4C6-C98DA3205C09}" type="datetimeFigureOut">
               <a:rPr lang="en-US" smtClean="0"/>
               <a:pPr/>
-              <a:t>4/29/2019</a:t>
+              <a:t>5/17/2019</a:t>
             </a:fld>
             <a:endParaRPr lang="en-US"/>
           </a:p>
@@ -1158,7 +1469,7 @@
             <a:fld id="{1D8BD707-D9CF-40AE-B4C6-C98DA3205C09}" type="datetimeFigureOut">
               <a:rPr lang="en-US" smtClean="0"/>
               <a:pPr/>
-              <a:t>4/29/2019</a:t>
+              <a:t>5/17/2019</a:t>
             </a:fld>
             <a:endParaRPr lang="en-US"/>
           </a:p>
@@ -1401,7 +1712,7 @@
             <a:fld id="{1D8BD707-D9CF-40AE-B4C6-C98DA3205C09}" type="datetimeFigureOut">
               <a:rPr lang="en-US" smtClean="0"/>
               <a:pPr/>
-              <a:t>4/29/2019</a:t>
+              <a:t>5/17/2019</a:t>
             </a:fld>
             <a:endParaRPr lang="en-US"/>
           </a:p>
@@ -1686,7 +1997,7 @@
             <a:fld id="{1D8BD707-D9CF-40AE-B4C6-C98DA3205C09}" type="datetimeFigureOut">
               <a:rPr lang="en-US" smtClean="0"/>
               <a:pPr/>
-              <a:t>4/29/2019</a:t>
+              <a:t>5/17/2019</a:t>
             </a:fld>
             <a:endParaRPr lang="en-US"/>
           </a:p>
@@ -2105,7 +2416,7 @@
             <a:fld id="{1D8BD707-D9CF-40AE-B4C6-C98DA3205C09}" type="datetimeFigureOut">
               <a:rPr lang="en-US" smtClean="0"/>
               <a:pPr/>
-              <a:t>4/29/2019</a:t>
+              <a:t>5/17/2019</a:t>
             </a:fld>
             <a:endParaRPr lang="en-US"/>
           </a:p>
@@ -2220,7 +2531,7 @@
             <a:fld id="{1D8BD707-D9CF-40AE-B4C6-C98DA3205C09}" type="datetimeFigureOut">
               <a:rPr lang="en-US" smtClean="0"/>
               <a:pPr/>
-              <a:t>4/29/2019</a:t>
+              <a:t>5/17/2019</a:t>
             </a:fld>
             <a:endParaRPr lang="en-US"/>
           </a:p>
@@ -2312,7 +2623,7 @@
             <a:fld id="{1D8BD707-D9CF-40AE-B4C6-C98DA3205C09}" type="datetimeFigureOut">
               <a:rPr lang="en-US" smtClean="0"/>
               <a:pPr/>
-              <a:t>4/29/2019</a:t>
+              <a:t>5/17/2019</a:t>
             </a:fld>
             <a:endParaRPr lang="en-US"/>
           </a:p>
@@ -2586,7 +2897,7 @@
             <a:fld id="{1D8BD707-D9CF-40AE-B4C6-C98DA3205C09}" type="datetimeFigureOut">
               <a:rPr lang="en-US" smtClean="0"/>
               <a:pPr/>
-              <a:t>4/29/2019</a:t>
+              <a:t>5/17/2019</a:t>
             </a:fld>
             <a:endParaRPr lang="en-US"/>
           </a:p>
@@ -2836,7 +3147,7 @@
             <a:fld id="{1D8BD707-D9CF-40AE-B4C6-C98DA3205C09}" type="datetimeFigureOut">
               <a:rPr lang="en-US" smtClean="0"/>
               <a:pPr/>
-              <a:t>4/29/2019</a:t>
+              <a:t>5/17/2019</a:t>
             </a:fld>
             <a:endParaRPr lang="en-US"/>
           </a:p>
@@ -3046,7 +3357,7 @@
             <a:fld id="{1D8BD707-D9CF-40AE-B4C6-C98DA3205C09}" type="datetimeFigureOut">
               <a:rPr lang="en-US" smtClean="0"/>
               <a:pPr/>
-              <a:t>4/29/2019</a:t>
+              <a:t>5/17/2019</a:t>
             </a:fld>
             <a:endParaRPr lang="en-US"/>
           </a:p>
@@ -4015,12 +4326,12 @@
           <a:p>
             <a:pPr algn="ctr"/>
             <a:r>
-              <a:rPr lang="en-US" sz="1200" b="1" dirty="0" smtClean="0">
+              <a:rPr lang="en-US" altLang="zh-CN" sz="1200" b="1" dirty="0" smtClean="0">
                 <a:solidFill>
                   <a:srgbClr val="0070C0"/>
                 </a:solidFill>
               </a:rPr>
-              <a:t>Scheduler</a:t>
+              <a:t>Dash Board</a:t>
             </a:r>
             <a:endParaRPr lang="en-US" sz="1200" b="1" dirty="0">
               <a:solidFill>
@@ -4504,7 +4815,7 @@
         <p:spPr>
           <a:xfrm>
             <a:off x="2239688" y="942201"/>
-            <a:ext cx="803425" cy="276999"/>
+            <a:ext cx="899092" cy="276999"/>
           </a:xfrm>
           <a:prstGeom prst="rect">
             <a:avLst/>
@@ -4522,7 +4833,7 @@
           <a:p>
             <a:r>
               <a:rPr lang="en-US" sz="1200" dirty="0" smtClean="0"/>
-              <a:t>Scheduler</a:t>
+              <a:t>Dash Board</a:t>
             </a:r>
             <a:endParaRPr lang="en-US" sz="1200" dirty="0"/>
           </a:p>
@@ -5018,1119 +5329,48 @@
           </a:p>
         </p:txBody>
       </p:sp>
-    </p:spTree>
-  </p:cSld>
-  <p:clrMapOvr>
-    <a:masterClrMapping/>
-  </p:clrMapOvr>
-</p:sld>
-</file>
-
-<file path=ppt/slides/slide2.xml><?xml version="1.0" encoding="utf-8"?>
-<p:sld xmlns:a="http://schemas.openxmlformats.org/drawingml/2006/main" xmlns:r="http://schemas.openxmlformats.org/officeDocument/2006/relationships" xmlns:p="http://schemas.openxmlformats.org/presentationml/2006/main">
-  <p:cSld>
-    <p:spTree>
-      <p:nvGrpSpPr>
-        <p:cNvPr id="1" name=""/>
-        <p:cNvGrpSpPr/>
-        <p:nvPr/>
-      </p:nvGrpSpPr>
-      <p:grpSpPr>
-        <a:xfrm>
-          <a:off x="0" y="0"/>
-          <a:ext cx="0" cy="0"/>
-          <a:chOff x="0" y="0"/>
-          <a:chExt cx="0" cy="0"/>
-        </a:xfrm>
-      </p:grpSpPr>
-      <p:sp>
-        <p:nvSpPr>
-          <p:cNvPr id="4" name="Rectangle 3"/>
-          <p:cNvSpPr/>
+      <p:graphicFrame>
+        <p:nvGraphicFramePr>
+          <p:cNvPr id="46" name="Chart 45"/>
+          <p:cNvGraphicFramePr/>
           <p:nvPr/>
-        </p:nvSpPr>
-        <p:spPr>
-          <a:xfrm>
-            <a:off x="381000" y="457200"/>
-            <a:ext cx="1600200" cy="381000"/>
-          </a:xfrm>
-          <a:prstGeom prst="rect">
-            <a:avLst/>
-          </a:prstGeom>
-        </p:spPr>
-        <p:style>
-          <a:lnRef idx="2">
-            <a:schemeClr val="accent1">
-              <a:shade val="50000"/>
-            </a:schemeClr>
-          </a:lnRef>
-          <a:fillRef idx="1">
-            <a:schemeClr val="accent1"/>
-          </a:fillRef>
-          <a:effectRef idx="0">
-            <a:schemeClr val="accent1"/>
-          </a:effectRef>
-          <a:fontRef idx="minor">
-            <a:schemeClr val="lt1"/>
-          </a:fontRef>
-        </p:style>
-        <p:txBody>
-          <a:bodyPr rtlCol="0" anchor="ctr"/>
-          <a:lstStyle/>
-          <a:p>
-            <a:pPr algn="ctr"/>
-            <a:r>
-              <a:rPr lang="en-US" altLang="zh-CN" dirty="0" smtClean="0"/>
-              <a:t>Registration</a:t>
-            </a:r>
-            <a:endParaRPr lang="en-US" dirty="0"/>
-          </a:p>
-        </p:txBody>
-      </p:sp>
-      <p:sp>
-        <p:nvSpPr>
-          <p:cNvPr id="5" name="Rectangle 4"/>
-          <p:cNvSpPr/>
+        </p:nvGraphicFramePr>
+        <p:xfrm>
+          <a:off x="5181600" y="1295400"/>
+          <a:ext cx="3657600" cy="2133600"/>
+        </p:xfrm>
+        <a:graphic>
+          <a:graphicData uri="http://schemas.openxmlformats.org/drawingml/2006/chart">
+            <c:chart xmlns:c="http://schemas.openxmlformats.org/drawingml/2006/chart" xmlns:r="http://schemas.openxmlformats.org/officeDocument/2006/relationships" r:id="rId2"/>
+          </a:graphicData>
+        </a:graphic>
+      </p:graphicFrame>
+      <p:graphicFrame>
+        <p:nvGraphicFramePr>
+          <p:cNvPr id="47" name="Chart 46"/>
+          <p:cNvGraphicFramePr/>
           <p:nvPr/>
-        </p:nvSpPr>
-        <p:spPr>
-          <a:xfrm>
-            <a:off x="381000" y="3200400"/>
-            <a:ext cx="1600200" cy="381000"/>
-          </a:xfrm>
-          <a:prstGeom prst="rect">
-            <a:avLst/>
-          </a:prstGeom>
-        </p:spPr>
-        <p:style>
-          <a:lnRef idx="2">
-            <a:schemeClr val="accent1">
-              <a:shade val="50000"/>
-            </a:schemeClr>
-          </a:lnRef>
-          <a:fillRef idx="1">
-            <a:schemeClr val="accent1"/>
-          </a:fillRef>
-          <a:effectRef idx="0">
-            <a:schemeClr val="accent1"/>
-          </a:effectRef>
-          <a:fontRef idx="minor">
-            <a:schemeClr val="lt1"/>
-          </a:fontRef>
-        </p:style>
-        <p:txBody>
-          <a:bodyPr rtlCol="0" anchor="ctr"/>
-          <a:lstStyle/>
-          <a:p>
-            <a:pPr algn="ctr"/>
-            <a:r>
-              <a:rPr lang="en-US" dirty="0" smtClean="0"/>
-              <a:t>Browser</a:t>
-            </a:r>
-            <a:endParaRPr lang="en-US" dirty="0"/>
-          </a:p>
-        </p:txBody>
-      </p:sp>
-      <p:sp>
-        <p:nvSpPr>
-          <p:cNvPr id="6" name="Rectangle 5"/>
-          <p:cNvSpPr/>
-          <p:nvPr/>
-        </p:nvSpPr>
-        <p:spPr>
-          <a:xfrm>
-            <a:off x="304800" y="381000"/>
-            <a:ext cx="1752600" cy="2209800"/>
-          </a:xfrm>
-          <a:prstGeom prst="rect">
-            <a:avLst/>
-          </a:prstGeom>
-          <a:noFill/>
-        </p:spPr>
-        <p:style>
-          <a:lnRef idx="2">
-            <a:schemeClr val="accent1">
-              <a:shade val="50000"/>
-            </a:schemeClr>
-          </a:lnRef>
-          <a:fillRef idx="1">
-            <a:schemeClr val="accent1"/>
-          </a:fillRef>
-          <a:effectRef idx="0">
-            <a:schemeClr val="accent1"/>
-          </a:effectRef>
-          <a:fontRef idx="minor">
-            <a:schemeClr val="lt1"/>
-          </a:fontRef>
-        </p:style>
-        <p:txBody>
-          <a:bodyPr rtlCol="0" anchor="ctr"/>
-          <a:lstStyle/>
-          <a:p>
-            <a:pPr algn="ctr"/>
-            <a:endParaRPr lang="en-US"/>
-          </a:p>
-        </p:txBody>
-      </p:sp>
-      <p:sp>
-        <p:nvSpPr>
-          <p:cNvPr id="7" name="Rectangle 6"/>
-          <p:cNvSpPr/>
-          <p:nvPr/>
-        </p:nvSpPr>
-        <p:spPr>
-          <a:xfrm>
-            <a:off x="304800" y="3124200"/>
-            <a:ext cx="1752600" cy="2895600"/>
-          </a:xfrm>
-          <a:prstGeom prst="rect">
-            <a:avLst/>
-          </a:prstGeom>
-          <a:noFill/>
-        </p:spPr>
-        <p:style>
-          <a:lnRef idx="2">
-            <a:schemeClr val="accent1">
-              <a:shade val="50000"/>
-            </a:schemeClr>
-          </a:lnRef>
-          <a:fillRef idx="1">
-            <a:schemeClr val="accent1"/>
-          </a:fillRef>
-          <a:effectRef idx="0">
-            <a:schemeClr val="accent1"/>
-          </a:effectRef>
-          <a:fontRef idx="minor">
-            <a:schemeClr val="lt1"/>
-          </a:fontRef>
-        </p:style>
-        <p:txBody>
-          <a:bodyPr rtlCol="0" anchor="ctr"/>
-          <a:lstStyle/>
-          <a:p>
-            <a:pPr algn="ctr"/>
-            <a:endParaRPr lang="en-US"/>
-          </a:p>
-        </p:txBody>
-      </p:sp>
-      <p:sp>
-        <p:nvSpPr>
-          <p:cNvPr id="8" name="TextBox 7"/>
+        </p:nvGraphicFramePr>
+        <p:xfrm>
+          <a:off x="2667000" y="1828800"/>
+          <a:ext cx="2362200" cy="1447800"/>
+        </p:xfrm>
+        <a:graphic>
+          <a:graphicData uri="http://schemas.openxmlformats.org/drawingml/2006/chart">
+            <c:chart xmlns:c="http://schemas.openxmlformats.org/drawingml/2006/chart" xmlns:r="http://schemas.openxmlformats.org/officeDocument/2006/relationships" r:id="rId3"/>
+          </a:graphicData>
+        </a:graphic>
+      </p:graphicFrame>
+      <p:sp>
+        <p:nvSpPr>
+          <p:cNvPr id="49" name="TextBox 48"/>
           <p:cNvSpPr txBox="1"/>
           <p:nvPr/>
         </p:nvSpPr>
         <p:spPr>
           <a:xfrm>
-            <a:off x="664469" y="3782199"/>
-            <a:ext cx="741165" cy="276999"/>
-          </a:xfrm>
-          <a:prstGeom prst="rect">
-            <a:avLst/>
-          </a:prstGeom>
-          <a:noFill/>
-        </p:spPr>
-        <p:txBody>
-          <a:bodyPr wrap="none" rtlCol="0">
-            <a:spAutoFit/>
-          </a:bodyPr>
-          <a:lstStyle/>
-          <a:p>
-            <a:r>
-              <a:rPr lang="en-US" sz="1200" i="1" u="sng" dirty="0" smtClean="0">
-                <a:solidFill>
-                  <a:srgbClr val="0070C0"/>
-                </a:solidFill>
-              </a:rPr>
-              <a:t>Batteries</a:t>
-            </a:r>
-            <a:endParaRPr lang="en-US" sz="1200" i="1" u="sng" dirty="0">
-              <a:solidFill>
-                <a:srgbClr val="0070C0"/>
-              </a:solidFill>
-            </a:endParaRPr>
-          </a:p>
-        </p:txBody>
-      </p:sp>
-      <p:sp>
-        <p:nvSpPr>
-          <p:cNvPr id="9" name="TextBox 8"/>
-          <p:cNvSpPr txBox="1"/>
-          <p:nvPr/>
-        </p:nvSpPr>
-        <p:spPr>
-          <a:xfrm>
-            <a:off x="969269" y="3962400"/>
-            <a:ext cx="553806" cy="276999"/>
-          </a:xfrm>
-          <a:prstGeom prst="rect">
-            <a:avLst/>
-          </a:prstGeom>
-          <a:noFill/>
-        </p:spPr>
-        <p:txBody>
-          <a:bodyPr wrap="none" rtlCol="0">
-            <a:spAutoFit/>
-          </a:bodyPr>
-          <a:lstStyle/>
-          <a:p>
-            <a:r>
-              <a:rPr lang="en-US" sz="1200" i="1" u="sng" dirty="0" smtClean="0">
-                <a:solidFill>
-                  <a:srgbClr val="0070C0"/>
-                </a:solidFill>
-              </a:rPr>
-              <a:t>Pack1</a:t>
-            </a:r>
-            <a:endParaRPr lang="en-US" sz="1200" i="1" u="sng" dirty="0">
-              <a:solidFill>
-                <a:srgbClr val="0070C0"/>
-              </a:solidFill>
-            </a:endParaRPr>
-          </a:p>
-        </p:txBody>
-      </p:sp>
-      <p:sp>
-        <p:nvSpPr>
-          <p:cNvPr id="10" name="TextBox 9"/>
-          <p:cNvSpPr txBox="1"/>
-          <p:nvPr/>
-        </p:nvSpPr>
-        <p:spPr>
-          <a:xfrm>
-            <a:off x="969269" y="4163199"/>
-            <a:ext cx="553806" cy="276999"/>
-          </a:xfrm>
-          <a:prstGeom prst="rect">
-            <a:avLst/>
-          </a:prstGeom>
-          <a:noFill/>
-        </p:spPr>
-        <p:txBody>
-          <a:bodyPr wrap="none" rtlCol="0">
-            <a:spAutoFit/>
-          </a:bodyPr>
-          <a:lstStyle/>
-          <a:p>
-            <a:r>
-              <a:rPr lang="en-US" sz="1200" i="1" u="sng" dirty="0" smtClean="0">
-                <a:solidFill>
-                  <a:srgbClr val="0070C0"/>
-                </a:solidFill>
-              </a:rPr>
-              <a:t>Pack2</a:t>
-            </a:r>
-            <a:endParaRPr lang="en-US" sz="1200" i="1" u="sng" dirty="0">
-              <a:solidFill>
-                <a:srgbClr val="0070C0"/>
-              </a:solidFill>
-            </a:endParaRPr>
-          </a:p>
-        </p:txBody>
-      </p:sp>
-      <p:sp>
-        <p:nvSpPr>
-          <p:cNvPr id="11" name="TextBox 10"/>
-          <p:cNvSpPr txBox="1"/>
-          <p:nvPr/>
-        </p:nvSpPr>
-        <p:spPr>
-          <a:xfrm>
-            <a:off x="664469" y="4419600"/>
-            <a:ext cx="808235" cy="276999"/>
-          </a:xfrm>
-          <a:prstGeom prst="rect">
-            <a:avLst/>
-          </a:prstGeom>
-          <a:noFill/>
-        </p:spPr>
-        <p:txBody>
-          <a:bodyPr wrap="none" rtlCol="0">
-            <a:spAutoFit/>
-          </a:bodyPr>
-          <a:lstStyle/>
-          <a:p>
-            <a:r>
-              <a:rPr lang="en-US" sz="1200" i="1" u="sng" dirty="0" smtClean="0">
-                <a:solidFill>
-                  <a:srgbClr val="0070C0"/>
-                </a:solidFill>
-              </a:rPr>
-              <a:t>Chambers</a:t>
-            </a:r>
-            <a:endParaRPr lang="en-US" sz="1200" i="1" u="sng" dirty="0">
-              <a:solidFill>
-                <a:srgbClr val="0070C0"/>
-              </a:solidFill>
-            </a:endParaRPr>
-          </a:p>
-        </p:txBody>
-      </p:sp>
-      <p:sp>
-        <p:nvSpPr>
-          <p:cNvPr id="12" name="TextBox 11"/>
-          <p:cNvSpPr txBox="1"/>
-          <p:nvPr/>
-        </p:nvSpPr>
-        <p:spPr>
-          <a:xfrm>
-            <a:off x="969269" y="4599801"/>
-            <a:ext cx="859531" cy="276999"/>
-          </a:xfrm>
-          <a:prstGeom prst="rect">
-            <a:avLst/>
-          </a:prstGeom>
-          <a:noFill/>
-        </p:spPr>
-        <p:txBody>
-          <a:bodyPr wrap="none" rtlCol="0">
-            <a:spAutoFit/>
-          </a:bodyPr>
-          <a:lstStyle/>
-          <a:p>
-            <a:r>
-              <a:rPr lang="en-US" sz="1200" i="1" u="sng" dirty="0" smtClean="0">
-                <a:solidFill>
-                  <a:srgbClr val="0070C0"/>
-                </a:solidFill>
-              </a:rPr>
-              <a:t>Hong Zhan</a:t>
-            </a:r>
-            <a:endParaRPr lang="en-US" sz="1200" i="1" u="sng" dirty="0">
-              <a:solidFill>
-                <a:srgbClr val="0070C0"/>
-              </a:solidFill>
-            </a:endParaRPr>
-          </a:p>
-        </p:txBody>
-      </p:sp>
-      <p:sp>
-        <p:nvSpPr>
-          <p:cNvPr id="20" name="TextBox 19"/>
-          <p:cNvSpPr txBox="1"/>
-          <p:nvPr/>
-        </p:nvSpPr>
-        <p:spPr>
-          <a:xfrm>
-            <a:off x="457200" y="3581400"/>
-            <a:ext cx="576568" cy="276999"/>
-          </a:xfrm>
-          <a:prstGeom prst="rect">
-            <a:avLst/>
-          </a:prstGeom>
-          <a:noFill/>
-        </p:spPr>
-        <p:txBody>
-          <a:bodyPr wrap="none" rtlCol="0">
-            <a:spAutoFit/>
-          </a:bodyPr>
-          <a:lstStyle/>
-          <a:p>
-            <a:r>
-              <a:rPr lang="en-US" sz="1200" i="1" u="sng" dirty="0" smtClean="0">
-                <a:solidFill>
-                  <a:srgbClr val="0070C0"/>
-                </a:solidFill>
-              </a:rPr>
-              <a:t>Assets</a:t>
-            </a:r>
-            <a:endParaRPr lang="en-US" sz="1200" i="1" u="sng" dirty="0">
-              <a:solidFill>
-                <a:srgbClr val="0070C0"/>
-              </a:solidFill>
-            </a:endParaRPr>
-          </a:p>
-        </p:txBody>
-      </p:sp>
-      <p:sp>
-        <p:nvSpPr>
-          <p:cNvPr id="22" name="TextBox 21"/>
-          <p:cNvSpPr txBox="1"/>
-          <p:nvPr/>
-        </p:nvSpPr>
-        <p:spPr>
-          <a:xfrm>
-            <a:off x="457200" y="4800600"/>
-            <a:ext cx="787395" cy="276999"/>
-          </a:xfrm>
-          <a:prstGeom prst="rect">
-            <a:avLst/>
-          </a:prstGeom>
-          <a:noFill/>
-        </p:spPr>
-        <p:txBody>
-          <a:bodyPr wrap="none" rtlCol="0">
-            <a:spAutoFit/>
-          </a:bodyPr>
-          <a:lstStyle/>
-          <a:p>
-            <a:r>
-              <a:rPr lang="en-US" sz="1200" i="1" u="sng" dirty="0" smtClean="0">
-                <a:solidFill>
-                  <a:srgbClr val="0070C0"/>
-                </a:solidFill>
-              </a:rPr>
-              <a:t>Programs</a:t>
-            </a:r>
-            <a:endParaRPr lang="en-US" sz="1200" i="1" u="sng" dirty="0">
-              <a:solidFill>
-                <a:srgbClr val="0070C0"/>
-              </a:solidFill>
-            </a:endParaRPr>
-          </a:p>
-        </p:txBody>
-      </p:sp>
-      <p:sp>
-        <p:nvSpPr>
-          <p:cNvPr id="23" name="TextBox 22"/>
-          <p:cNvSpPr txBox="1"/>
-          <p:nvPr/>
-        </p:nvSpPr>
-        <p:spPr>
-          <a:xfrm>
-            <a:off x="304800" y="3581400"/>
-            <a:ext cx="231154" cy="276999"/>
-          </a:xfrm>
-          <a:prstGeom prst="rect">
-            <a:avLst/>
-          </a:prstGeom>
-          <a:noFill/>
-        </p:spPr>
-        <p:txBody>
-          <a:bodyPr wrap="none" rtlCol="0">
-            <a:spAutoFit/>
-          </a:bodyPr>
-          <a:lstStyle/>
-          <a:p>
-            <a:r>
-              <a:rPr lang="en-US" sz="1200" dirty="0" smtClean="0"/>
-              <a:t>-</a:t>
-            </a:r>
-            <a:endParaRPr lang="en-US" sz="1200" dirty="0"/>
-          </a:p>
-        </p:txBody>
-      </p:sp>
-      <p:sp>
-        <p:nvSpPr>
-          <p:cNvPr id="24" name="TextBox 23"/>
-          <p:cNvSpPr txBox="1"/>
-          <p:nvPr/>
-        </p:nvSpPr>
-        <p:spPr>
-          <a:xfrm>
-            <a:off x="304800" y="4800600"/>
-            <a:ext cx="261610" cy="276999"/>
-          </a:xfrm>
-          <a:prstGeom prst="rect">
-            <a:avLst/>
-          </a:prstGeom>
-          <a:noFill/>
-        </p:spPr>
-        <p:txBody>
-          <a:bodyPr wrap="none" rtlCol="0">
-            <a:spAutoFit/>
-          </a:bodyPr>
-          <a:lstStyle/>
-          <a:p>
-            <a:r>
-              <a:rPr lang="en-US" sz="1200" dirty="0" smtClean="0"/>
-              <a:t>+</a:t>
-            </a:r>
-            <a:endParaRPr lang="en-US" sz="1200" dirty="0"/>
-          </a:p>
-        </p:txBody>
-      </p:sp>
-      <p:sp>
-        <p:nvSpPr>
-          <p:cNvPr id="25" name="TextBox 24"/>
-          <p:cNvSpPr txBox="1"/>
-          <p:nvPr/>
-        </p:nvSpPr>
-        <p:spPr>
-          <a:xfrm>
-            <a:off x="457200" y="4980801"/>
-            <a:ext cx="738087" cy="276999"/>
-          </a:xfrm>
-          <a:prstGeom prst="rect">
-            <a:avLst/>
-          </a:prstGeom>
-          <a:noFill/>
-        </p:spPr>
-        <p:txBody>
-          <a:bodyPr wrap="none" rtlCol="0">
-            <a:spAutoFit/>
-          </a:bodyPr>
-          <a:lstStyle/>
-          <a:p>
-            <a:r>
-              <a:rPr lang="en-US" sz="1200" i="1" u="sng" dirty="0" smtClean="0">
-                <a:solidFill>
-                  <a:srgbClr val="0070C0"/>
-                </a:solidFill>
-              </a:rPr>
-              <a:t>Requests</a:t>
-            </a:r>
-            <a:endParaRPr lang="en-US" sz="1200" i="1" u="sng" dirty="0">
-              <a:solidFill>
-                <a:srgbClr val="0070C0"/>
-              </a:solidFill>
-            </a:endParaRPr>
-          </a:p>
-        </p:txBody>
-      </p:sp>
-      <p:sp>
-        <p:nvSpPr>
-          <p:cNvPr id="26" name="TextBox 25"/>
-          <p:cNvSpPr txBox="1"/>
-          <p:nvPr/>
-        </p:nvSpPr>
-        <p:spPr>
-          <a:xfrm>
-            <a:off x="304800" y="4980801"/>
-            <a:ext cx="261610" cy="276999"/>
-          </a:xfrm>
-          <a:prstGeom prst="rect">
-            <a:avLst/>
-          </a:prstGeom>
-          <a:noFill/>
-        </p:spPr>
-        <p:txBody>
-          <a:bodyPr wrap="none" rtlCol="0">
-            <a:spAutoFit/>
-          </a:bodyPr>
-          <a:lstStyle/>
-          <a:p>
-            <a:r>
-              <a:rPr lang="en-US" sz="1200" dirty="0" smtClean="0"/>
-              <a:t>+</a:t>
-            </a:r>
-            <a:endParaRPr lang="en-US" sz="1200" dirty="0"/>
-          </a:p>
-        </p:txBody>
-      </p:sp>
-      <p:sp>
-        <p:nvSpPr>
-          <p:cNvPr id="27" name="TextBox 26"/>
-          <p:cNvSpPr txBox="1"/>
-          <p:nvPr/>
-        </p:nvSpPr>
-        <p:spPr>
-          <a:xfrm>
-            <a:off x="304800" y="2743200"/>
-            <a:ext cx="1752600" cy="276999"/>
-          </a:xfrm>
-          <a:prstGeom prst="rect">
-            <a:avLst/>
-          </a:prstGeom>
-          <a:solidFill>
-            <a:srgbClr val="FFC000"/>
-          </a:solidFill>
-          <a:ln>
-            <a:solidFill>
-              <a:schemeClr val="accent1">
-                <a:shade val="95000"/>
-                <a:satMod val="105000"/>
-              </a:schemeClr>
-            </a:solidFill>
-          </a:ln>
-        </p:spPr>
-        <p:txBody>
-          <a:bodyPr wrap="square" rtlCol="0">
-            <a:spAutoFit/>
-          </a:bodyPr>
-          <a:lstStyle/>
-          <a:p>
-            <a:pPr algn="ctr"/>
-            <a:r>
-              <a:rPr lang="en-US" sz="1200" b="1" dirty="0" smtClean="0">
-                <a:solidFill>
-                  <a:srgbClr val="0070C0"/>
-                </a:solidFill>
-              </a:rPr>
-              <a:t>Scheduler</a:t>
-            </a:r>
-            <a:endParaRPr lang="en-US" sz="1200" b="1" dirty="0">
-              <a:solidFill>
-                <a:srgbClr val="0070C0"/>
-              </a:solidFill>
-            </a:endParaRPr>
-          </a:p>
-        </p:txBody>
-      </p:sp>
-      <p:sp>
-        <p:nvSpPr>
-          <p:cNvPr id="28" name="TextBox 27"/>
-          <p:cNvSpPr txBox="1"/>
-          <p:nvPr/>
-        </p:nvSpPr>
-        <p:spPr>
-          <a:xfrm>
-            <a:off x="457200" y="838200"/>
-            <a:ext cx="900311" cy="276999"/>
-          </a:xfrm>
-          <a:prstGeom prst="rect">
-            <a:avLst/>
-          </a:prstGeom>
-          <a:noFill/>
-        </p:spPr>
-        <p:txBody>
-          <a:bodyPr wrap="none" rtlCol="0">
-            <a:spAutoFit/>
-          </a:bodyPr>
-          <a:lstStyle/>
-          <a:p>
-            <a:r>
-              <a:rPr lang="en-US" sz="1200" i="1" u="sng" dirty="0" smtClean="0">
-                <a:solidFill>
-                  <a:srgbClr val="0070C0"/>
-                </a:solidFill>
-              </a:rPr>
-              <a:t>New Model</a:t>
-            </a:r>
-            <a:endParaRPr lang="en-US" sz="1200" i="1" u="sng" dirty="0">
-              <a:solidFill>
-                <a:srgbClr val="0070C0"/>
-              </a:solidFill>
-            </a:endParaRPr>
-          </a:p>
-        </p:txBody>
-      </p:sp>
-      <p:sp>
-        <p:nvSpPr>
-          <p:cNvPr id="29" name="TextBox 28"/>
-          <p:cNvSpPr txBox="1"/>
-          <p:nvPr/>
-        </p:nvSpPr>
-        <p:spPr>
-          <a:xfrm>
-            <a:off x="457200" y="1002156"/>
-            <a:ext cx="960712" cy="276999"/>
-          </a:xfrm>
-          <a:prstGeom prst="rect">
-            <a:avLst/>
-          </a:prstGeom>
-          <a:noFill/>
-        </p:spPr>
-        <p:txBody>
-          <a:bodyPr wrap="none" rtlCol="0">
-            <a:spAutoFit/>
-          </a:bodyPr>
-          <a:lstStyle/>
-          <a:p>
-            <a:r>
-              <a:rPr lang="en-US" sz="1200" i="1" u="sng" dirty="0" smtClean="0">
-                <a:solidFill>
-                  <a:srgbClr val="0070C0"/>
-                </a:solidFill>
-              </a:rPr>
-              <a:t>New Battery</a:t>
-            </a:r>
-            <a:endParaRPr lang="en-US" sz="1200" i="1" u="sng" dirty="0">
-              <a:solidFill>
-                <a:srgbClr val="0070C0"/>
-              </a:solidFill>
-            </a:endParaRPr>
-          </a:p>
-        </p:txBody>
-      </p:sp>
-      <p:sp>
-        <p:nvSpPr>
-          <p:cNvPr id="30" name="TextBox 29"/>
-          <p:cNvSpPr txBox="1"/>
-          <p:nvPr/>
-        </p:nvSpPr>
-        <p:spPr>
-          <a:xfrm>
-            <a:off x="457200" y="1166112"/>
-            <a:ext cx="1067023" cy="276999"/>
-          </a:xfrm>
-          <a:prstGeom prst="rect">
-            <a:avLst/>
-          </a:prstGeom>
-          <a:noFill/>
-        </p:spPr>
-        <p:txBody>
-          <a:bodyPr wrap="none" rtlCol="0">
-            <a:spAutoFit/>
-          </a:bodyPr>
-          <a:lstStyle/>
-          <a:p>
-            <a:r>
-              <a:rPr lang="en-US" sz="1200" i="1" u="sng" dirty="0" smtClean="0">
-                <a:solidFill>
-                  <a:srgbClr val="0070C0"/>
-                </a:solidFill>
-              </a:rPr>
-              <a:t>New Chamber</a:t>
-            </a:r>
-            <a:endParaRPr lang="en-US" sz="1200" i="1" u="sng" dirty="0">
-              <a:solidFill>
-                <a:srgbClr val="0070C0"/>
-              </a:solidFill>
-            </a:endParaRPr>
-          </a:p>
-        </p:txBody>
-      </p:sp>
-      <p:sp>
-        <p:nvSpPr>
-          <p:cNvPr id="31" name="TextBox 30"/>
-          <p:cNvSpPr txBox="1"/>
-          <p:nvPr/>
-        </p:nvSpPr>
-        <p:spPr>
-          <a:xfrm>
-            <a:off x="457200" y="1330068"/>
-            <a:ext cx="872675" cy="276999"/>
-          </a:xfrm>
-          <a:prstGeom prst="rect">
-            <a:avLst/>
-          </a:prstGeom>
-          <a:noFill/>
-        </p:spPr>
-        <p:txBody>
-          <a:bodyPr wrap="none" rtlCol="0">
-            <a:spAutoFit/>
-          </a:bodyPr>
-          <a:lstStyle/>
-          <a:p>
-            <a:r>
-              <a:rPr lang="en-US" sz="1200" i="1" u="sng" dirty="0" smtClean="0">
-                <a:solidFill>
-                  <a:srgbClr val="0070C0"/>
-                </a:solidFill>
-              </a:rPr>
-              <a:t>New Tester</a:t>
-            </a:r>
-            <a:endParaRPr lang="en-US" sz="1200" i="1" u="sng" dirty="0">
-              <a:solidFill>
-                <a:srgbClr val="0070C0"/>
-              </a:solidFill>
-            </a:endParaRPr>
-          </a:p>
-        </p:txBody>
-      </p:sp>
-      <p:sp>
-        <p:nvSpPr>
-          <p:cNvPr id="32" name="TextBox 31"/>
-          <p:cNvSpPr txBox="1"/>
-          <p:nvPr/>
-        </p:nvSpPr>
-        <p:spPr>
-          <a:xfrm>
-            <a:off x="457200" y="1494024"/>
-            <a:ext cx="1046184" cy="276999"/>
-          </a:xfrm>
-          <a:prstGeom prst="rect">
-            <a:avLst/>
-          </a:prstGeom>
-          <a:noFill/>
-        </p:spPr>
-        <p:txBody>
-          <a:bodyPr wrap="none" rtlCol="0">
-            <a:spAutoFit/>
-          </a:bodyPr>
-          <a:lstStyle/>
-          <a:p>
-            <a:r>
-              <a:rPr lang="en-US" sz="1200" i="1" u="sng" dirty="0" smtClean="0">
-                <a:solidFill>
-                  <a:srgbClr val="0070C0"/>
-                </a:solidFill>
-              </a:rPr>
-              <a:t>New Program</a:t>
-            </a:r>
-            <a:endParaRPr lang="en-US" sz="1200" i="1" u="sng" dirty="0">
-              <a:solidFill>
-                <a:srgbClr val="0070C0"/>
-              </a:solidFill>
-            </a:endParaRPr>
-          </a:p>
-        </p:txBody>
-      </p:sp>
-      <p:sp>
-        <p:nvSpPr>
-          <p:cNvPr id="33" name="TextBox 32"/>
-          <p:cNvSpPr txBox="1"/>
-          <p:nvPr/>
-        </p:nvSpPr>
-        <p:spPr>
-          <a:xfrm>
-            <a:off x="457200" y="1657980"/>
-            <a:ext cx="1307474" cy="276999"/>
-          </a:xfrm>
-          <a:prstGeom prst="rect">
-            <a:avLst/>
-          </a:prstGeom>
-          <a:noFill/>
-        </p:spPr>
-        <p:txBody>
-          <a:bodyPr wrap="none" rtlCol="0">
-            <a:spAutoFit/>
-          </a:bodyPr>
-          <a:lstStyle/>
-          <a:p>
-            <a:r>
-              <a:rPr lang="en-US" sz="1200" i="1" u="sng" dirty="0" smtClean="0">
-                <a:solidFill>
-                  <a:srgbClr val="0070C0"/>
-                </a:solidFill>
-              </a:rPr>
-              <a:t>New Sub Program</a:t>
-            </a:r>
-            <a:endParaRPr lang="en-US" sz="1200" i="1" u="sng" dirty="0">
-              <a:solidFill>
-                <a:srgbClr val="0070C0"/>
-              </a:solidFill>
-            </a:endParaRPr>
-          </a:p>
-        </p:txBody>
-      </p:sp>
-      <p:sp>
-        <p:nvSpPr>
-          <p:cNvPr id="34" name="TextBox 33"/>
-          <p:cNvSpPr txBox="1"/>
-          <p:nvPr/>
-        </p:nvSpPr>
-        <p:spPr>
-          <a:xfrm>
-            <a:off x="457200" y="1821936"/>
-            <a:ext cx="908839" cy="276999"/>
-          </a:xfrm>
-          <a:prstGeom prst="rect">
-            <a:avLst/>
-          </a:prstGeom>
-          <a:noFill/>
-        </p:spPr>
-        <p:txBody>
-          <a:bodyPr wrap="none" rtlCol="0">
-            <a:spAutoFit/>
-          </a:bodyPr>
-          <a:lstStyle/>
-          <a:p>
-            <a:r>
-              <a:rPr lang="en-US" sz="1200" i="1" u="sng" dirty="0" smtClean="0">
-                <a:solidFill>
-                  <a:srgbClr val="0070C0"/>
-                </a:solidFill>
-              </a:rPr>
-              <a:t>New Recipe</a:t>
-            </a:r>
-            <a:endParaRPr lang="en-US" sz="1200" i="1" u="sng" dirty="0">
-              <a:solidFill>
-                <a:srgbClr val="0070C0"/>
-              </a:solidFill>
-            </a:endParaRPr>
-          </a:p>
-        </p:txBody>
-      </p:sp>
-      <p:sp>
-        <p:nvSpPr>
-          <p:cNvPr id="35" name="TextBox 34"/>
-          <p:cNvSpPr txBox="1"/>
-          <p:nvPr/>
-        </p:nvSpPr>
-        <p:spPr>
-          <a:xfrm>
-            <a:off x="457200" y="1985892"/>
-            <a:ext cx="1508362" cy="276999"/>
-          </a:xfrm>
-          <a:prstGeom prst="rect">
-            <a:avLst/>
-          </a:prstGeom>
-          <a:noFill/>
-        </p:spPr>
-        <p:txBody>
-          <a:bodyPr wrap="none" rtlCol="0">
-            <a:spAutoFit/>
-          </a:bodyPr>
-          <a:lstStyle/>
-          <a:p>
-            <a:r>
-              <a:rPr lang="en-US" sz="1200" i="1" u="sng" dirty="0" smtClean="0">
-                <a:solidFill>
-                  <a:srgbClr val="0070C0"/>
-                </a:solidFill>
-              </a:rPr>
-              <a:t>New Chamber Recipe</a:t>
-            </a:r>
-            <a:endParaRPr lang="en-US" sz="1200" i="1" u="sng" dirty="0">
-              <a:solidFill>
-                <a:srgbClr val="0070C0"/>
-              </a:solidFill>
-            </a:endParaRPr>
-          </a:p>
-        </p:txBody>
-      </p:sp>
-      <p:sp>
-        <p:nvSpPr>
-          <p:cNvPr id="36" name="TextBox 35"/>
-          <p:cNvSpPr txBox="1"/>
-          <p:nvPr/>
-        </p:nvSpPr>
-        <p:spPr>
-          <a:xfrm>
-            <a:off x="457200" y="2149848"/>
-            <a:ext cx="1314014" cy="276999"/>
-          </a:xfrm>
-          <a:prstGeom prst="rect">
-            <a:avLst/>
-          </a:prstGeom>
-          <a:noFill/>
-        </p:spPr>
-        <p:txBody>
-          <a:bodyPr wrap="none" rtlCol="0">
-            <a:spAutoFit/>
-          </a:bodyPr>
-          <a:lstStyle/>
-          <a:p>
-            <a:r>
-              <a:rPr lang="en-US" sz="1200" i="1" u="sng" dirty="0" smtClean="0">
-                <a:solidFill>
-                  <a:srgbClr val="0070C0"/>
-                </a:solidFill>
-              </a:rPr>
-              <a:t>New Tester Recipe</a:t>
-            </a:r>
-            <a:endParaRPr lang="en-US" sz="1200" i="1" u="sng" dirty="0">
-              <a:solidFill>
-                <a:srgbClr val="0070C0"/>
-              </a:solidFill>
-            </a:endParaRPr>
-          </a:p>
-        </p:txBody>
-      </p:sp>
-      <p:sp>
-        <p:nvSpPr>
-          <p:cNvPr id="37" name="TextBox 36"/>
-          <p:cNvSpPr txBox="1"/>
-          <p:nvPr/>
-        </p:nvSpPr>
-        <p:spPr>
-          <a:xfrm>
-            <a:off x="457200" y="2313801"/>
-            <a:ext cx="996876" cy="276999"/>
-          </a:xfrm>
-          <a:prstGeom prst="rect">
-            <a:avLst/>
-          </a:prstGeom>
-          <a:noFill/>
-        </p:spPr>
-        <p:txBody>
-          <a:bodyPr wrap="none" rtlCol="0">
-            <a:spAutoFit/>
-          </a:bodyPr>
-          <a:lstStyle/>
-          <a:p>
-            <a:r>
-              <a:rPr lang="en-US" sz="1200" i="1" u="sng" dirty="0" smtClean="0">
-                <a:solidFill>
-                  <a:srgbClr val="0070C0"/>
-                </a:solidFill>
-              </a:rPr>
-              <a:t>New Request</a:t>
-            </a:r>
-            <a:endParaRPr lang="en-US" sz="1200" i="1" u="sng" dirty="0">
-              <a:solidFill>
-                <a:srgbClr val="0070C0"/>
-              </a:solidFill>
-            </a:endParaRPr>
-          </a:p>
-        </p:txBody>
-      </p:sp>
-      <p:sp>
-        <p:nvSpPr>
-          <p:cNvPr id="38" name="Rectangle 37"/>
-          <p:cNvSpPr/>
-          <p:nvPr/>
-        </p:nvSpPr>
-        <p:spPr>
-          <a:xfrm>
-            <a:off x="2209800" y="457200"/>
-            <a:ext cx="6629400" cy="381000"/>
-          </a:xfrm>
-          <a:prstGeom prst="rect">
-            <a:avLst/>
-          </a:prstGeom>
-        </p:spPr>
-        <p:style>
-          <a:lnRef idx="2">
-            <a:schemeClr val="accent1">
-              <a:shade val="50000"/>
-            </a:schemeClr>
-          </a:lnRef>
-          <a:fillRef idx="1">
-            <a:schemeClr val="accent1"/>
-          </a:fillRef>
-          <a:effectRef idx="0">
-            <a:schemeClr val="accent1"/>
-          </a:effectRef>
-          <a:fontRef idx="minor">
-            <a:schemeClr val="lt1"/>
-          </a:fontRef>
-        </p:style>
-        <p:txBody>
-          <a:bodyPr rtlCol="0" anchor="ctr"/>
-          <a:lstStyle/>
-          <a:p>
-            <a:pPr algn="ctr"/>
-            <a:r>
-              <a:rPr lang="en-US" dirty="0" smtClean="0"/>
-              <a:t>Workspaces</a:t>
-            </a:r>
-            <a:endParaRPr lang="en-US" dirty="0"/>
-          </a:p>
-        </p:txBody>
-      </p:sp>
-      <p:sp>
-        <p:nvSpPr>
-          <p:cNvPr id="39" name="Rectangle 38"/>
-          <p:cNvSpPr/>
-          <p:nvPr/>
-        </p:nvSpPr>
-        <p:spPr>
-          <a:xfrm>
-            <a:off x="2133600" y="381000"/>
-            <a:ext cx="6781800" cy="5638800"/>
-          </a:xfrm>
-          <a:prstGeom prst="rect">
-            <a:avLst/>
-          </a:prstGeom>
-          <a:noFill/>
-        </p:spPr>
-        <p:style>
-          <a:lnRef idx="2">
-            <a:schemeClr val="accent1">
-              <a:shade val="50000"/>
-            </a:schemeClr>
-          </a:lnRef>
-          <a:fillRef idx="1">
-            <a:schemeClr val="accent1"/>
-          </a:fillRef>
-          <a:effectRef idx="0">
-            <a:schemeClr val="accent1"/>
-          </a:effectRef>
-          <a:fontRef idx="minor">
-            <a:schemeClr val="lt1"/>
-          </a:fontRef>
-        </p:style>
-        <p:txBody>
-          <a:bodyPr rtlCol="0" anchor="ctr"/>
-          <a:lstStyle/>
-          <a:p>
-            <a:pPr algn="ctr"/>
-            <a:endParaRPr lang="en-US"/>
-          </a:p>
-        </p:txBody>
-      </p:sp>
-      <p:sp>
-        <p:nvSpPr>
-          <p:cNvPr id="52" name="TextBox 51"/>
-          <p:cNvSpPr txBox="1"/>
-          <p:nvPr/>
-        </p:nvSpPr>
-        <p:spPr>
-          <a:xfrm>
-            <a:off x="2239688" y="942201"/>
-            <a:ext cx="803425" cy="276999"/>
+            <a:off x="3276600" y="1524000"/>
+            <a:ext cx="1151341" cy="307777"/>
           </a:xfrm>
           <a:prstGeom prst="rect">
             <a:avLst/>
@@ -6147,500 +5387,10 @@
           <a:lstStyle/>
           <a:p>
             <a:r>
-              <a:rPr lang="en-US" sz="1200" dirty="0" smtClean="0"/>
-              <a:t>Scheduler</a:t>
-            </a:r>
-            <a:endParaRPr lang="en-US" sz="1200" dirty="0"/>
-          </a:p>
-        </p:txBody>
-      </p:sp>
-      <p:sp>
-        <p:nvSpPr>
-          <p:cNvPr id="53" name="TextBox 52"/>
-          <p:cNvSpPr txBox="1"/>
-          <p:nvPr/>
-        </p:nvSpPr>
-        <p:spPr>
-          <a:xfrm>
-            <a:off x="3382688" y="990600"/>
-            <a:ext cx="960071" cy="276999"/>
-          </a:xfrm>
-          <a:prstGeom prst="rect">
-            <a:avLst/>
-          </a:prstGeom>
-          <a:noFill/>
-          <a:ln>
-            <a:noFill/>
-          </a:ln>
-        </p:spPr>
-        <p:txBody>
-          <a:bodyPr wrap="none" rtlCol="0">
-            <a:spAutoFit/>
-          </a:bodyPr>
-          <a:lstStyle/>
-          <a:p>
-            <a:r>
-              <a:rPr lang="en-US" sz="1200" dirty="0" smtClean="0"/>
-              <a:t>New Battery</a:t>
-            </a:r>
-            <a:endParaRPr lang="en-US" sz="1200" dirty="0"/>
-          </a:p>
-        </p:txBody>
-      </p:sp>
-      <p:sp>
-        <p:nvSpPr>
-          <p:cNvPr id="54" name="TextBox 53"/>
-          <p:cNvSpPr txBox="1"/>
-          <p:nvPr/>
-        </p:nvSpPr>
-        <p:spPr>
-          <a:xfrm>
-            <a:off x="4631578" y="990600"/>
-            <a:ext cx="550022" cy="276999"/>
-          </a:xfrm>
-          <a:prstGeom prst="rect">
-            <a:avLst/>
-          </a:prstGeom>
-          <a:noFill/>
-          <a:ln>
-            <a:noFill/>
-          </a:ln>
-        </p:spPr>
-        <p:txBody>
-          <a:bodyPr wrap="none" rtlCol="0">
-            <a:spAutoFit/>
-          </a:bodyPr>
-          <a:lstStyle/>
-          <a:p>
-            <a:r>
-              <a:rPr lang="en-US" sz="1200" dirty="0" smtClean="0"/>
-              <a:t>Pack1</a:t>
-            </a:r>
-            <a:endParaRPr lang="en-US" sz="1200" dirty="0"/>
-          </a:p>
-        </p:txBody>
-      </p:sp>
-      <p:cxnSp>
-        <p:nvCxnSpPr>
-          <p:cNvPr id="56" name="Straight Connector 55"/>
-          <p:cNvCxnSpPr/>
-          <p:nvPr/>
-        </p:nvCxnSpPr>
-        <p:spPr>
-          <a:xfrm>
-            <a:off x="2209800" y="914400"/>
-            <a:ext cx="1143000" cy="0"/>
-          </a:xfrm>
-          <a:prstGeom prst="line">
-            <a:avLst/>
-          </a:prstGeom>
-          <a:ln w="19050"/>
-        </p:spPr>
-        <p:style>
-          <a:lnRef idx="1">
-            <a:schemeClr val="accent1"/>
-          </a:lnRef>
-          <a:fillRef idx="0">
-            <a:schemeClr val="accent1"/>
-          </a:fillRef>
-          <a:effectRef idx="0">
-            <a:schemeClr val="accent1"/>
-          </a:effectRef>
-          <a:fontRef idx="minor">
-            <a:schemeClr val="tx1"/>
-          </a:fontRef>
-        </p:style>
-      </p:cxnSp>
-      <p:cxnSp>
-        <p:nvCxnSpPr>
-          <p:cNvPr id="57" name="Straight Connector 56"/>
-          <p:cNvCxnSpPr/>
-          <p:nvPr/>
-        </p:nvCxnSpPr>
-        <p:spPr>
-          <a:xfrm flipV="1">
-            <a:off x="3361766" y="914400"/>
-            <a:ext cx="0" cy="381000"/>
-          </a:xfrm>
-          <a:prstGeom prst="line">
-            <a:avLst/>
-          </a:prstGeom>
-          <a:ln w="19050"/>
-        </p:spPr>
-        <p:style>
-          <a:lnRef idx="1">
-            <a:schemeClr val="accent1"/>
-          </a:lnRef>
-          <a:fillRef idx="0">
-            <a:schemeClr val="accent1"/>
-          </a:fillRef>
-          <a:effectRef idx="0">
-            <a:schemeClr val="accent1"/>
-          </a:effectRef>
-          <a:fontRef idx="minor">
-            <a:schemeClr val="tx1"/>
-          </a:fontRef>
-        </p:style>
-      </p:cxnSp>
-      <p:cxnSp>
-        <p:nvCxnSpPr>
-          <p:cNvPr id="60" name="Straight Connector 59"/>
-          <p:cNvCxnSpPr/>
-          <p:nvPr/>
-        </p:nvCxnSpPr>
-        <p:spPr>
-          <a:xfrm flipV="1">
-            <a:off x="2209800" y="914400"/>
-            <a:ext cx="0" cy="5029200"/>
-          </a:xfrm>
-          <a:prstGeom prst="line">
-            <a:avLst/>
-          </a:prstGeom>
-          <a:ln w="19050"/>
-        </p:spPr>
-        <p:style>
-          <a:lnRef idx="1">
-            <a:schemeClr val="accent1"/>
-          </a:lnRef>
-          <a:fillRef idx="0">
-            <a:schemeClr val="accent1"/>
-          </a:fillRef>
-          <a:effectRef idx="0">
-            <a:schemeClr val="accent1"/>
-          </a:effectRef>
-          <a:fontRef idx="minor">
-            <a:schemeClr val="tx1"/>
-          </a:fontRef>
-        </p:style>
-      </p:cxnSp>
-      <p:cxnSp>
-        <p:nvCxnSpPr>
-          <p:cNvPr id="62" name="Straight Connector 61"/>
-          <p:cNvCxnSpPr/>
-          <p:nvPr/>
-        </p:nvCxnSpPr>
-        <p:spPr>
-          <a:xfrm>
-            <a:off x="2209800" y="5943600"/>
-            <a:ext cx="6629400" cy="0"/>
-          </a:xfrm>
-          <a:prstGeom prst="line">
-            <a:avLst/>
-          </a:prstGeom>
-          <a:ln w="19050"/>
-        </p:spPr>
-        <p:style>
-          <a:lnRef idx="1">
-            <a:schemeClr val="accent1"/>
-          </a:lnRef>
-          <a:fillRef idx="0">
-            <a:schemeClr val="accent1"/>
-          </a:fillRef>
-          <a:effectRef idx="0">
-            <a:schemeClr val="accent1"/>
-          </a:effectRef>
-          <a:fontRef idx="minor">
-            <a:schemeClr val="tx1"/>
-          </a:fontRef>
-        </p:style>
-      </p:cxnSp>
-      <p:cxnSp>
-        <p:nvCxnSpPr>
-          <p:cNvPr id="65" name="Straight Connector 64"/>
-          <p:cNvCxnSpPr/>
-          <p:nvPr/>
-        </p:nvCxnSpPr>
-        <p:spPr>
-          <a:xfrm flipV="1">
-            <a:off x="8839200" y="1295400"/>
-            <a:ext cx="0" cy="4648200"/>
-          </a:xfrm>
-          <a:prstGeom prst="line">
-            <a:avLst/>
-          </a:prstGeom>
-          <a:ln w="19050"/>
-        </p:spPr>
-        <p:style>
-          <a:lnRef idx="1">
-            <a:schemeClr val="accent1"/>
-          </a:lnRef>
-          <a:fillRef idx="0">
-            <a:schemeClr val="accent1"/>
-          </a:fillRef>
-          <a:effectRef idx="0">
-            <a:schemeClr val="accent1"/>
-          </a:effectRef>
-          <a:fontRef idx="minor">
-            <a:schemeClr val="tx1"/>
-          </a:fontRef>
-        </p:style>
-      </p:cxnSp>
-      <p:cxnSp>
-        <p:nvCxnSpPr>
-          <p:cNvPr id="66" name="Straight Connector 65"/>
-          <p:cNvCxnSpPr/>
-          <p:nvPr/>
-        </p:nvCxnSpPr>
-        <p:spPr>
-          <a:xfrm>
-            <a:off x="3352800" y="1295400"/>
-            <a:ext cx="5486400" cy="0"/>
-          </a:xfrm>
-          <a:prstGeom prst="line">
-            <a:avLst/>
-          </a:prstGeom>
-          <a:ln w="19050"/>
-        </p:spPr>
-        <p:style>
-          <a:lnRef idx="1">
-            <a:schemeClr val="accent1"/>
-          </a:lnRef>
-          <a:fillRef idx="0">
-            <a:schemeClr val="accent1"/>
-          </a:fillRef>
-          <a:effectRef idx="0">
-            <a:schemeClr val="accent1"/>
-          </a:effectRef>
-          <a:fontRef idx="minor">
-            <a:schemeClr val="tx1"/>
-          </a:fontRef>
-        </p:style>
-      </p:cxnSp>
-      <p:cxnSp>
-        <p:nvCxnSpPr>
-          <p:cNvPr id="71" name="Straight Connector 70"/>
-          <p:cNvCxnSpPr/>
-          <p:nvPr/>
-        </p:nvCxnSpPr>
-        <p:spPr>
-          <a:xfrm>
-            <a:off x="3352800" y="990600"/>
-            <a:ext cx="1295400" cy="0"/>
-          </a:xfrm>
-          <a:prstGeom prst="line">
-            <a:avLst/>
-          </a:prstGeom>
-          <a:ln w="19050"/>
-        </p:spPr>
-        <p:style>
-          <a:lnRef idx="1">
-            <a:schemeClr val="accent1"/>
-          </a:lnRef>
-          <a:fillRef idx="0">
-            <a:schemeClr val="accent1"/>
-          </a:fillRef>
-          <a:effectRef idx="0">
-            <a:schemeClr val="accent1"/>
-          </a:effectRef>
-          <a:fontRef idx="minor">
-            <a:schemeClr val="tx1"/>
-          </a:fontRef>
-        </p:style>
-      </p:cxnSp>
-      <p:cxnSp>
-        <p:nvCxnSpPr>
-          <p:cNvPr id="73" name="Straight Connector 72"/>
-          <p:cNvCxnSpPr/>
-          <p:nvPr/>
-        </p:nvCxnSpPr>
-        <p:spPr>
-          <a:xfrm flipV="1">
-            <a:off x="4648200" y="990600"/>
-            <a:ext cx="0" cy="304800"/>
-          </a:xfrm>
-          <a:prstGeom prst="line">
-            <a:avLst/>
-          </a:prstGeom>
-          <a:ln w="19050"/>
-        </p:spPr>
-        <p:style>
-          <a:lnRef idx="1">
-            <a:schemeClr val="accent1"/>
-          </a:lnRef>
-          <a:fillRef idx="0">
-            <a:schemeClr val="accent1"/>
-          </a:fillRef>
-          <a:effectRef idx="0">
-            <a:schemeClr val="accent1"/>
-          </a:effectRef>
-          <a:fontRef idx="minor">
-            <a:schemeClr val="tx1"/>
-          </a:fontRef>
-        </p:style>
-      </p:cxnSp>
-      <p:cxnSp>
-        <p:nvCxnSpPr>
-          <p:cNvPr id="75" name="Straight Connector 74"/>
-          <p:cNvCxnSpPr/>
-          <p:nvPr/>
-        </p:nvCxnSpPr>
-        <p:spPr>
-          <a:xfrm>
-            <a:off x="4648200" y="990600"/>
-            <a:ext cx="838200" cy="0"/>
-          </a:xfrm>
-          <a:prstGeom prst="line">
-            <a:avLst/>
-          </a:prstGeom>
-          <a:ln w="19050"/>
-        </p:spPr>
-        <p:style>
-          <a:lnRef idx="1">
-            <a:schemeClr val="accent1"/>
-          </a:lnRef>
-          <a:fillRef idx="0">
-            <a:schemeClr val="accent1"/>
-          </a:fillRef>
-          <a:effectRef idx="0">
-            <a:schemeClr val="accent1"/>
-          </a:effectRef>
-          <a:fontRef idx="minor">
-            <a:schemeClr val="tx1"/>
-          </a:fontRef>
-        </p:style>
-      </p:cxnSp>
-      <p:cxnSp>
-        <p:nvCxnSpPr>
-          <p:cNvPr id="76" name="Straight Connector 75"/>
-          <p:cNvCxnSpPr/>
-          <p:nvPr/>
-        </p:nvCxnSpPr>
-        <p:spPr>
-          <a:xfrm flipV="1">
-            <a:off x="5486400" y="990600"/>
-            <a:ext cx="0" cy="304800"/>
-          </a:xfrm>
-          <a:prstGeom prst="line">
-            <a:avLst/>
-          </a:prstGeom>
-          <a:ln w="19050"/>
-        </p:spPr>
-        <p:style>
-          <a:lnRef idx="1">
-            <a:schemeClr val="accent1"/>
-          </a:lnRef>
-          <a:fillRef idx="0">
-            <a:schemeClr val="accent1"/>
-          </a:fillRef>
-          <a:effectRef idx="0">
-            <a:schemeClr val="accent1"/>
-          </a:effectRef>
-          <a:fontRef idx="minor">
-            <a:schemeClr val="tx1"/>
-          </a:fontRef>
-        </p:style>
-      </p:cxnSp>
-      <p:sp>
-        <p:nvSpPr>
-          <p:cNvPr id="78" name="TextBox 77"/>
-          <p:cNvSpPr txBox="1"/>
-          <p:nvPr/>
-        </p:nvSpPr>
-        <p:spPr>
-          <a:xfrm>
-            <a:off x="3048000" y="990600"/>
-            <a:ext cx="237566" cy="215444"/>
-          </a:xfrm>
-          <a:prstGeom prst="rect">
-            <a:avLst/>
-          </a:prstGeom>
-          <a:noFill/>
-          <a:ln>
-            <a:solidFill>
-              <a:schemeClr val="accent1">
-                <a:shade val="95000"/>
-                <a:satMod val="105000"/>
-              </a:schemeClr>
-            </a:solidFill>
-          </a:ln>
-        </p:spPr>
-        <p:txBody>
-          <a:bodyPr wrap="none" rtlCol="0">
-            <a:spAutoFit/>
-          </a:bodyPr>
-          <a:lstStyle/>
-          <a:p>
-            <a:r>
-              <a:rPr lang="en-US" sz="800" dirty="0" smtClean="0"/>
-              <a:t>X</a:t>
-            </a:r>
-            <a:endParaRPr lang="en-US" sz="800" dirty="0"/>
-          </a:p>
-        </p:txBody>
-      </p:sp>
-      <p:sp>
-        <p:nvSpPr>
-          <p:cNvPr id="81" name="TextBox 80"/>
-          <p:cNvSpPr txBox="1"/>
-          <p:nvPr/>
-        </p:nvSpPr>
-        <p:spPr>
-          <a:xfrm>
-            <a:off x="4334434" y="1029634"/>
-            <a:ext cx="237566" cy="215444"/>
-          </a:xfrm>
-          <a:prstGeom prst="rect">
-            <a:avLst/>
-          </a:prstGeom>
-          <a:noFill/>
-          <a:ln>
-            <a:solidFill>
-              <a:schemeClr val="accent1">
-                <a:shade val="95000"/>
-                <a:satMod val="105000"/>
-              </a:schemeClr>
-            </a:solidFill>
-          </a:ln>
-        </p:spPr>
-        <p:txBody>
-          <a:bodyPr wrap="none" rtlCol="0">
-            <a:spAutoFit/>
-          </a:bodyPr>
-          <a:lstStyle/>
-          <a:p>
-            <a:r>
-              <a:rPr lang="en-US" sz="800" dirty="0" smtClean="0"/>
-              <a:t>X</a:t>
-            </a:r>
-            <a:endParaRPr lang="en-US" sz="800" dirty="0"/>
-          </a:p>
-        </p:txBody>
-      </p:sp>
-      <p:sp>
-        <p:nvSpPr>
-          <p:cNvPr id="82" name="TextBox 81"/>
-          <p:cNvSpPr txBox="1"/>
-          <p:nvPr/>
-        </p:nvSpPr>
-        <p:spPr>
-          <a:xfrm>
-            <a:off x="5172634" y="1029634"/>
-            <a:ext cx="237566" cy="215444"/>
-          </a:xfrm>
-          <a:prstGeom prst="rect">
-            <a:avLst/>
-          </a:prstGeom>
-          <a:noFill/>
-          <a:ln>
-            <a:solidFill>
-              <a:schemeClr val="accent1">
-                <a:shade val="95000"/>
-                <a:satMod val="105000"/>
-              </a:schemeClr>
-            </a:solidFill>
-          </a:ln>
-        </p:spPr>
-        <p:txBody>
-          <a:bodyPr wrap="none" rtlCol="0">
-            <a:spAutoFit/>
-          </a:bodyPr>
-          <a:lstStyle/>
-          <a:p>
-            <a:r>
-              <a:rPr lang="en-US" sz="800" dirty="0" smtClean="0"/>
-              <a:t>X</a:t>
-            </a:r>
-            <a:endParaRPr lang="en-US" sz="800" dirty="0"/>
+              <a:rPr lang="en-US" sz="1400" b="1" dirty="0" smtClean="0"/>
+              <a:t>Assets Usage</a:t>
+            </a:r>
+            <a:endParaRPr lang="en-US" sz="1400" b="1" dirty="0"/>
           </a:p>
         </p:txBody>
       </p:sp>

</xml_diff>